<commit_message>
Updated splicer input output diagram
</commit_message>
<xml_diff>
--- a/Write Up/Power Point/Dia.pptx
+++ b/Write Up/Power Point/Dia.pptx
@@ -3227,11 +3227,6 @@
                 </a:rPr>
                 <a:t>p1</a:t>
               </a:r>
-              <a:endParaRPr lang="en-GB" sz="5023" dirty="0">
-                <a:solidFill>
-                  <a:schemeClr val="accent1"/>
-                </a:solidFill>
-              </a:endParaRPr>
             </a:p>
           </p:txBody>
         </p:sp>
@@ -3265,11 +3260,6 @@
                 </a:rPr>
                 <a:t>p2</a:t>
               </a:r>
-              <a:endParaRPr lang="en-GB" sz="5023" dirty="0">
-                <a:solidFill>
-                  <a:schemeClr val="accent1"/>
-                </a:solidFill>
-              </a:endParaRPr>
             </a:p>
           </p:txBody>
         </p:sp>
@@ -3303,11 +3293,6 @@
                 </a:rPr>
                 <a:t>p3</a:t>
               </a:r>
-              <a:endParaRPr lang="en-GB" sz="5023" dirty="0">
-                <a:solidFill>
-                  <a:schemeClr val="accent1"/>
-                </a:solidFill>
-              </a:endParaRPr>
             </a:p>
           </p:txBody>
         </p:sp>
@@ -3341,11 +3326,6 @@
                 </a:rPr>
                 <a:t>v1</a:t>
               </a:r>
-              <a:endParaRPr lang="en-GB" sz="5023" dirty="0">
-                <a:solidFill>
-                  <a:schemeClr val="accent2"/>
-                </a:solidFill>
-              </a:endParaRPr>
             </a:p>
           </p:txBody>
         </p:sp>
@@ -3379,11 +3359,6 @@
                 </a:rPr>
                 <a:t>v2</a:t>
               </a:r>
-              <a:endParaRPr lang="en-GB" sz="5023" dirty="0">
-                <a:solidFill>
-                  <a:schemeClr val="accent4"/>
-                </a:solidFill>
-              </a:endParaRPr>
             </a:p>
           </p:txBody>
         </p:sp>
@@ -3573,7 +3548,6 @@
               <a:rPr lang="en-GB" sz="5023" dirty="0"/>
               <a:t>Normalised and dot product</a:t>
             </a:r>
-            <a:endParaRPr lang="en-GB" sz="5023" dirty="0"/>
           </a:p>
         </p:txBody>
       </p:sp>
@@ -3603,7 +3577,6 @@
               <a:rPr lang="en-GB" sz="5023" dirty="0"/>
               <a:t>Create two vectors</a:t>
             </a:r>
-            <a:endParaRPr lang="en-GB" sz="5023" dirty="0"/>
           </a:p>
         </p:txBody>
       </p:sp>
@@ -3773,7 +3746,6 @@
               <a:rPr lang="en-GB" sz="5023" dirty="0"/>
               <a:t>Track Splicer</a:t>
             </a:r>
-            <a:endParaRPr lang="en-GB" sz="5023" dirty="0"/>
           </a:p>
         </p:txBody>
       </p:sp>
@@ -3785,8 +3757,8 @@
         </p:nvSpPr>
         <p:spPr>
           <a:xfrm>
-            <a:off x="2706918" y="6590013"/>
-            <a:ext cx="2836467" cy="2509183"/>
+            <a:off x="2686463" y="6528649"/>
+            <a:ext cx="2836467" cy="2618280"/>
           </a:xfrm>
           <a:prstGeom prst="flowChartDocument">
             <a:avLst/>
@@ -3812,46 +3784,45 @@
           <a:p>
             <a:pPr algn="ctr"/>
             <a:r>
-              <a:rPr lang="en-GB" sz="5023" dirty="0"/>
+              <a:rPr lang="en-GB" sz="2400" dirty="0"/>
               <a:t>1,{0,0}</a:t>
             </a:r>
             <a:br>
-              <a:rPr lang="en-GB" sz="5023" dirty="0"/>
+              <a:rPr lang="en-GB" sz="2400" dirty="0"/>
             </a:br>
             <a:r>
-              <a:rPr lang="en-GB" sz="5023" dirty="0"/>
+              <a:rPr lang="en-GB" sz="2400" dirty="0"/>
               <a:t>2,{0.23,0}</a:t>
             </a:r>
             <a:br>
-              <a:rPr lang="en-GB" sz="5023" dirty="0"/>
+              <a:rPr lang="en-GB" sz="2400" dirty="0"/>
             </a:br>
             <a:r>
-              <a:rPr lang="en-GB" sz="5023" dirty="0"/>
+              <a:rPr lang="en-GB" sz="2400" dirty="0"/>
               <a:t>…..</a:t>
             </a:r>
             <a:br>
-              <a:rPr lang="en-GB" sz="5023" dirty="0"/>
+              <a:rPr lang="en-GB" sz="2400" dirty="0"/>
             </a:br>
             <a:r>
-              <a:rPr lang="en-GB" sz="5023" dirty="0"/>
+              <a:rPr lang="en-GB" sz="2400" dirty="0"/>
               <a:t>…..</a:t>
             </a:r>
             <a:br>
-              <a:rPr lang="en-GB" sz="5023" dirty="0"/>
+              <a:rPr lang="en-GB" sz="2400" dirty="0"/>
             </a:br>
             <a:r>
-              <a:rPr lang="en-GB" sz="5023" dirty="0"/>
+              <a:rPr lang="en-GB" sz="2400" dirty="0"/>
               <a:t>X,{</a:t>
             </a:r>
             <a:r>
-              <a:rPr lang="en-GB" sz="5023" dirty="0" err="1"/>
+              <a:rPr lang="en-GB" sz="2400" dirty="0" err="1"/>
               <a:t>x,y</a:t>
             </a:r>
             <a:r>
-              <a:rPr lang="en-GB" sz="5023" dirty="0"/>
+              <a:rPr lang="en-GB" sz="2400" dirty="0"/>
               <a:t>}</a:t>
             </a:r>
-            <a:endParaRPr lang="en-GB" sz="5023" dirty="0"/>
           </a:p>
         </p:txBody>
       </p:sp>
@@ -3863,7 +3834,7 @@
         </p:nvSpPr>
         <p:spPr>
           <a:xfrm>
-            <a:off x="12450459" y="6528648"/>
+            <a:off x="12090945" y="6549105"/>
             <a:ext cx="3109204" cy="2509183"/>
           </a:xfrm>
           <a:prstGeom prst="flowChartDocument">
@@ -3890,35 +3861,35 @@
           <a:p>
             <a:pPr algn="ctr"/>
             <a:r>
-              <a:rPr lang="en-GB" sz="5023" dirty="0"/>
+              <a:rPr lang="en-GB" sz="2400" dirty="0"/>
               <a:t>Straight,1528,90</a:t>
             </a:r>
           </a:p>
           <a:p>
             <a:pPr algn="ctr"/>
             <a:r>
-              <a:rPr lang="en-GB" sz="5023" dirty="0"/>
+              <a:rPr lang="en-GB" sz="2400" dirty="0"/>
               <a:t>Corner,91,242,165</a:t>
             </a:r>
             <a:br>
-              <a:rPr lang="en-GB" sz="5023" dirty="0"/>
+              <a:rPr lang="en-GB" sz="2400" dirty="0"/>
             </a:br>
             <a:r>
-              <a:rPr lang="en-GB" sz="5023" dirty="0"/>
+              <a:rPr lang="en-GB" sz="2400" dirty="0"/>
               <a:t>….</a:t>
             </a:r>
           </a:p>
           <a:p>
             <a:pPr algn="ctr"/>
             <a:r>
-              <a:rPr lang="en-GB" sz="5023" dirty="0"/>
+              <a:rPr lang="en-GB" sz="2400" dirty="0"/>
               <a:t>….</a:t>
             </a:r>
           </a:p>
           <a:p>
             <a:pPr algn="ctr"/>
             <a:r>
-              <a:rPr lang="en-GB" sz="5023" dirty="0"/>
+              <a:rPr lang="en-GB" sz="2400" dirty="0"/>
               <a:t>Corner,560,600,580</a:t>
             </a:r>
           </a:p>
@@ -3973,7 +3944,7 @@
         <p:spPr>
           <a:xfrm>
             <a:off x="10575389" y="7476412"/>
-            <a:ext cx="1444553" cy="715526"/>
+            <a:ext cx="1238659" cy="715526"/>
           </a:xfrm>
           <a:prstGeom prst="rightArrow">
             <a:avLst/>
@@ -4012,8 +3983,8 @@
         </p:nvSpPr>
         <p:spPr>
           <a:xfrm>
-            <a:off x="2768283" y="5969538"/>
-            <a:ext cx="4795480" cy="865301"/>
+            <a:off x="2497557" y="5974650"/>
+            <a:ext cx="3214278" cy="553998"/>
           </a:xfrm>
           <a:prstGeom prst="rect">
             <a:avLst/>
@@ -4027,10 +3998,13 @@
           <a:lstStyle/>
           <a:p>
             <a:r>
-              <a:rPr lang="en-GB" sz="5023" dirty="0"/>
-              <a:t>Race line data file</a:t>
-            </a:r>
-            <a:endParaRPr lang="en-GB" sz="5023" dirty="0"/>
+              <a:rPr lang="en-GB" sz="3000" dirty="0" smtClean="0"/>
+              <a:t>Racing </a:t>
+            </a:r>
+            <a:r>
+              <a:rPr lang="en-GB" sz="3000" dirty="0"/>
+              <a:t>line data file</a:t>
+            </a:r>
           </a:p>
         </p:txBody>
       </p:sp>
@@ -4042,8 +4016,8 @@
         </p:nvSpPr>
         <p:spPr>
           <a:xfrm>
-            <a:off x="12307271" y="5949084"/>
-            <a:ext cx="6088846" cy="865301"/>
+            <a:off x="11792091" y="5974650"/>
+            <a:ext cx="3706912" cy="553998"/>
           </a:xfrm>
           <a:prstGeom prst="rect">
             <a:avLst/>
@@ -4057,10 +4031,9 @@
           <a:lstStyle/>
           <a:p>
             <a:r>
-              <a:rPr lang="en-GB" sz="5023" dirty="0"/>
+              <a:rPr lang="en-GB" sz="3000" dirty="0"/>
               <a:t>Track sections data file</a:t>
             </a:r>
-            <a:endParaRPr lang="en-GB" sz="5023" dirty="0"/>
           </a:p>
         </p:txBody>
       </p:sp>
@@ -4072,8 +4045,8 @@
         </p:nvSpPr>
         <p:spPr>
           <a:xfrm>
-            <a:off x="3545584" y="9146928"/>
-            <a:ext cx="1577676" cy="865301"/>
+            <a:off x="2686464" y="9146928"/>
+            <a:ext cx="2836466" cy="553998"/>
           </a:xfrm>
           <a:prstGeom prst="rect">
             <a:avLst/>
@@ -4081,13 +4054,14 @@
           <a:noFill/>
         </p:spPr>
         <p:txBody>
-          <a:bodyPr wrap="none" rtlCol="0">
+          <a:bodyPr wrap="square" rtlCol="0">
             <a:spAutoFit/>
           </a:bodyPr>
           <a:lstStyle/>
           <a:p>
-            <a:r>
-              <a:rPr lang="en-GB" sz="5023" dirty="0"/>
+            <a:pPr algn="ctr"/>
+            <a:r>
+              <a:rPr lang="en-GB" sz="3000" dirty="0"/>
               <a:t>Input</a:t>
             </a:r>
           </a:p>
@@ -4101,8 +4075,8 @@
         </p:nvSpPr>
         <p:spPr>
           <a:xfrm>
-            <a:off x="13343673" y="9058288"/>
-            <a:ext cx="2058577" cy="865301"/>
+            <a:off x="12090945" y="9078745"/>
+            <a:ext cx="3109204" cy="553998"/>
           </a:xfrm>
           <a:prstGeom prst="rect">
             <a:avLst/>
@@ -4110,15 +4084,17 @@
           <a:noFill/>
         </p:spPr>
         <p:txBody>
-          <a:bodyPr wrap="none" rtlCol="0">
+          <a:bodyPr wrap="square" rtlCol="0">
             <a:spAutoFit/>
           </a:bodyPr>
           <a:lstStyle/>
           <a:p>
-            <a:r>
-              <a:rPr lang="en-GB" sz="5023" dirty="0"/>
+            <a:pPr algn="ctr"/>
+            <a:r>
+              <a:rPr lang="en-GB" sz="3000" dirty="0" smtClean="0"/>
               <a:t>Output</a:t>
             </a:r>
+            <a:endParaRPr lang="en-GB" sz="3000" dirty="0"/>
           </a:p>
         </p:txBody>
       </p:sp>
@@ -4307,11 +4283,6 @@
               </a:rPr>
               <a:t>p1</a:t>
             </a:r>
-            <a:endParaRPr lang="en-GB" sz="5023" dirty="0">
-              <a:solidFill>
-                <a:schemeClr val="accent1"/>
-              </a:solidFill>
-            </a:endParaRPr>
           </a:p>
         </p:txBody>
       </p:sp>
@@ -4888,7 +4859,6 @@
               <a:rPr lang="en-GB" sz="2067" dirty="0"/>
               <a:t>Thread x,1</a:t>
             </a:r>
-            <a:endParaRPr lang="en-GB" sz="2067" dirty="0"/>
           </a:p>
         </p:txBody>
       </p:sp>
@@ -4919,7 +4889,6 @@
               <a:rPr lang="en-GB" sz="2067" dirty="0"/>
               <a:t>Thread 2,1</a:t>
             </a:r>
-            <a:endParaRPr lang="en-GB" sz="2067" dirty="0"/>
           </a:p>
         </p:txBody>
       </p:sp>
@@ -4950,7 +4919,6 @@
               <a:rPr lang="en-GB" sz="2067" dirty="0"/>
               <a:t>Thread 1,1</a:t>
             </a:r>
-            <a:endParaRPr lang="en-GB" sz="2067" dirty="0"/>
           </a:p>
         </p:txBody>
       </p:sp>
@@ -4992,7 +4960,6 @@
               <a:rPr lang="en-GB" sz="5023" dirty="0"/>
               <a:t>Coordinator</a:t>
             </a:r>
-            <a:endParaRPr lang="en-GB" sz="5023" dirty="0"/>
           </a:p>
         </p:txBody>
       </p:sp>
@@ -5058,7 +5025,6 @@
               <a:rPr lang="en-GB" sz="5023" dirty="0"/>
               <a:t>Main Thread</a:t>
             </a:r>
-            <a:endParaRPr lang="en-GB" sz="5023" dirty="0"/>
           </a:p>
         </p:txBody>
       </p:sp>
@@ -5100,7 +5066,6 @@
               <a:rPr lang="en-GB" sz="5023" dirty="0"/>
               <a:t>Feedback Module 1</a:t>
             </a:r>
-            <a:endParaRPr lang="en-GB" sz="5023" dirty="0"/>
           </a:p>
         </p:txBody>
       </p:sp>
@@ -5142,7 +5107,6 @@
               <a:rPr lang="en-GB" sz="5023" dirty="0"/>
               <a:t>Feedback Module x</a:t>
             </a:r>
-            <a:endParaRPr lang="en-GB" sz="5023" dirty="0"/>
           </a:p>
         </p:txBody>
       </p:sp>
@@ -5184,7 +5148,6 @@
               <a:rPr lang="en-GB" sz="5023" dirty="0"/>
               <a:t>Feedback Module 2</a:t>
             </a:r>
-            <a:endParaRPr lang="en-GB" sz="5023" dirty="0"/>
           </a:p>
         </p:txBody>
       </p:sp>
@@ -5287,7 +5250,6 @@
               <a:rPr lang="en-GB" sz="5023" dirty="0"/>
               <a:t>Thread 1</a:t>
             </a:r>
-            <a:endParaRPr lang="en-GB" sz="5023" dirty="0"/>
           </a:p>
         </p:txBody>
       </p:sp>
@@ -5318,7 +5280,6 @@
               <a:rPr lang="en-GB" sz="5023" dirty="0"/>
               <a:t>Thread 2</a:t>
             </a:r>
-            <a:endParaRPr lang="en-GB" sz="5023" dirty="0"/>
           </a:p>
         </p:txBody>
       </p:sp>
@@ -5349,7 +5310,6 @@
               <a:rPr lang="en-GB" sz="5023" dirty="0"/>
               <a:t>Thread x </a:t>
             </a:r>
-            <a:endParaRPr lang="en-GB" sz="5023" dirty="0"/>
           </a:p>
         </p:txBody>
       </p:sp>
@@ -5649,7 +5609,6 @@
               <a:rPr lang="en-GB" sz="2067" dirty="0"/>
               <a:t>Module 1 Tasks</a:t>
             </a:r>
-            <a:endParaRPr lang="en-GB" sz="2067" dirty="0"/>
           </a:p>
         </p:txBody>
       </p:sp>
@@ -5691,7 +5650,6 @@
               <a:rPr lang="en-GB" sz="2067" dirty="0"/>
               <a:t>Module 2 Tasks</a:t>
             </a:r>
-            <a:endParaRPr lang="en-GB" sz="2067" dirty="0"/>
           </a:p>
         </p:txBody>
       </p:sp>
@@ -5733,7 +5691,6 @@
               <a:rPr lang="en-GB" sz="2067" dirty="0"/>
               <a:t>Module x Tasks</a:t>
             </a:r>
-            <a:endParaRPr lang="en-GB" sz="2067" dirty="0"/>
           </a:p>
         </p:txBody>
       </p:sp>
@@ -5799,7 +5756,6 @@
               <a:rPr lang="en-GB" sz="5023" dirty="0"/>
               <a:t>Shared Memory</a:t>
             </a:r>
-            <a:endParaRPr lang="en-GB" sz="5023" dirty="0"/>
           </a:p>
         </p:txBody>
       </p:sp>
@@ -5869,7 +5825,6 @@
               <a:rPr lang="en-GB" sz="1772" dirty="0"/>
               <a:t>Telemetry data</a:t>
             </a:r>
-            <a:endParaRPr lang="en-GB" sz="1772" dirty="0"/>
           </a:p>
         </p:txBody>
       </p:sp>
@@ -5899,7 +5854,6 @@
               <a:rPr lang="en-GB" sz="1772" dirty="0"/>
               <a:t>Telemetry data</a:t>
             </a:r>
-            <a:endParaRPr lang="en-GB" sz="1772" dirty="0"/>
           </a:p>
         </p:txBody>
       </p:sp>
@@ -6049,7 +6003,6 @@
               <a:rPr lang="en-GB" sz="1624" dirty="0"/>
               <a:t>New Feedback</a:t>
             </a:r>
-            <a:endParaRPr lang="en-GB" sz="1624" dirty="0"/>
           </a:p>
         </p:txBody>
       </p:sp>
@@ -6248,7 +6201,6 @@
               <a:rPr lang="en-GB" sz="1772" dirty="0"/>
               <a:t>New Telemetry Data</a:t>
             </a:r>
-            <a:endParaRPr lang="en-GB" sz="1772" dirty="0"/>
           </a:p>
         </p:txBody>
       </p:sp>

</xml_diff>

<commit_message>
Fixed typo in "Genre"
</commit_message>
<xml_diff>
--- a/Write Up/Power Point/Dia.pptx
+++ b/Write Up/Power Point/Dia.pptx
@@ -7074,7 +7074,7 @@
         </p:nvSpPr>
         <p:spPr>
           <a:xfrm>
-            <a:off x="898886" y="16566066"/>
+            <a:off x="3071816" y="14166995"/>
             <a:ext cx="1129553" cy="528918"/>
           </a:xfrm>
           <a:prstGeom prst="ellipse">
@@ -7120,7 +7120,7 @@
         </p:nvSpPr>
         <p:spPr>
           <a:xfrm>
-            <a:off x="2833903" y="16533738"/>
+            <a:off x="5006833" y="14134667"/>
             <a:ext cx="1200728" cy="528918"/>
           </a:xfrm>
           <a:prstGeom prst="ellipse">
@@ -7169,7 +7169,7 @@
         </p:nvCxnSpPr>
         <p:spPr>
           <a:xfrm rot="5400000" flipH="1" flipV="1">
-            <a:off x="2432800" y="15564601"/>
+            <a:off x="4605730" y="13165530"/>
             <a:ext cx="32328" cy="1970605"/>
           </a:xfrm>
           <a:prstGeom prst="curvedConnector3">
@@ -7204,7 +7204,7 @@
         </p:nvSpPr>
         <p:spPr>
           <a:xfrm>
-            <a:off x="1926567" y="16057800"/>
+            <a:off x="4099497" y="13658729"/>
             <a:ext cx="1134991" cy="276999"/>
           </a:xfrm>
           <a:prstGeom prst="rect">
@@ -7383,7 +7383,7 @@
         </p:nvCxnSpPr>
         <p:spPr>
           <a:xfrm rot="5400000">
-            <a:off x="2432801" y="16093519"/>
+            <a:off x="4605731" y="13694448"/>
             <a:ext cx="32328" cy="1970605"/>
           </a:xfrm>
           <a:prstGeom prst="curvedConnector3">
@@ -7418,7 +7418,7 @@
         </p:nvSpPr>
         <p:spPr>
           <a:xfrm>
-            <a:off x="1857295" y="17429400"/>
+            <a:off x="4030225" y="15030329"/>
             <a:ext cx="1201163" cy="276999"/>
           </a:xfrm>
           <a:prstGeom prst="rect">
@@ -7657,7 +7657,15 @@
             <a:pPr algn="ctr"/>
             <a:r>
               <a:rPr lang="en-GB" sz="1200" dirty="0" smtClean="0"/>
-              <a:t>Front slip &gt;= threshold</a:t>
+              <a:t>Front slip </a:t>
+            </a:r>
+            <a:r>
+              <a:rPr lang="en-GB" sz="1200" dirty="0" smtClean="0"/>
+              <a:t>&lt;= </a:t>
+            </a:r>
+            <a:r>
+              <a:rPr lang="en-GB" sz="1200" dirty="0" smtClean="0"/>
+              <a:t>threshold</a:t>
             </a:r>
             <a:endParaRPr lang="en-GB" sz="1200" dirty="0"/>
           </a:p>

</xml_diff>

<commit_message>
Added feedback event flowchart
</commit_message>
<xml_diff>
--- a/Write Up/Power Point/Dia.pptx
+++ b/Write Up/Power Point/Dia.pptx
@@ -6288,7 +6288,7 @@
         </p:nvSpPr>
         <p:spPr>
           <a:xfrm>
-            <a:off x="8358915" y="6695706"/>
+            <a:off x="6580333" y="5314718"/>
             <a:ext cx="1541931" cy="932329"/>
           </a:xfrm>
           <a:prstGeom prst="flowChartDecision">
@@ -6334,7 +6334,7 @@
         </p:nvSpPr>
         <p:spPr>
           <a:xfrm>
-            <a:off x="6688645" y="6861400"/>
+            <a:off x="5259664" y="5476350"/>
             <a:ext cx="914400" cy="612648"/>
           </a:xfrm>
           <a:prstGeom prst="flowChartProcess">
@@ -6380,7 +6380,7 @@
         </p:nvSpPr>
         <p:spPr>
           <a:xfrm>
-            <a:off x="10465318" y="6504035"/>
+            <a:off x="10454990" y="6609045"/>
             <a:ext cx="914400" cy="612648"/>
           </a:xfrm>
           <a:prstGeom prst="flowChartProcess">
@@ -6458,9 +6458,14 @@
           <a:p>
             <a:pPr algn="ctr"/>
             <a:r>
-              <a:rPr lang="en-GB" sz="1200" dirty="0"/>
-              <a:t>Is braking?</a:t>
-            </a:r>
+              <a:rPr lang="en-GB" sz="1200" dirty="0" smtClean="0"/>
+              <a:t>Event started </a:t>
+            </a:r>
+            <a:r>
+              <a:rPr lang="en-GB" sz="1200" dirty="0" smtClean="0"/>
+              <a:t>?</a:t>
+            </a:r>
+            <a:endParaRPr lang="en-GB" sz="1200" dirty="0"/>
           </a:p>
         </p:txBody>
       </p:sp>
@@ -6472,7 +6477,7 @@
         </p:nvSpPr>
         <p:spPr>
           <a:xfrm>
-            <a:off x="10141225" y="5304936"/>
+            <a:off x="10141225" y="5310723"/>
             <a:ext cx="1541931" cy="932329"/>
           </a:xfrm>
           <a:prstGeom prst="flowChartDecision">
@@ -6550,15 +6555,15 @@
         <p:nvCxnSpPr>
           <p:cNvPr id="11" name="Straight Arrow Connector 10"/>
           <p:cNvCxnSpPr>
-            <a:stCxn id="8" idx="2"/>
-            <a:endCxn id="5" idx="0"/>
+            <a:stCxn id="8" idx="1"/>
+            <a:endCxn id="5" idx="3"/>
           </p:cNvCxnSpPr>
           <p:nvPr/>
         </p:nvCxnSpPr>
         <p:spPr>
-          <a:xfrm>
-            <a:off x="9124822" y="6247047"/>
-            <a:ext cx="5059" cy="448659"/>
+          <a:xfrm flipH="1">
+            <a:off x="8122264" y="5780883"/>
+            <a:ext cx="334687" cy="0"/>
           </a:xfrm>
           <a:prstGeom prst="straightConnector1">
             <a:avLst/>
@@ -6619,7 +6624,7 @@
         </p:nvSpPr>
         <p:spPr>
           <a:xfrm>
-            <a:off x="8802126" y="6251121"/>
+            <a:off x="8153162" y="5502433"/>
             <a:ext cx="346570" cy="276999"/>
           </a:xfrm>
           <a:prstGeom prst="rect">
@@ -6651,8 +6656,8 @@
         </p:nvCxnSpPr>
         <p:spPr>
           <a:xfrm flipH="1">
-            <a:off x="7603045" y="7161871"/>
-            <a:ext cx="755870" cy="5853"/>
+            <a:off x="6174064" y="5780883"/>
+            <a:ext cx="406269" cy="1791"/>
           </a:xfrm>
           <a:prstGeom prst="straightConnector1">
             <a:avLst/>
@@ -6684,7 +6689,7 @@
         </p:nvSpPr>
         <p:spPr>
           <a:xfrm>
-            <a:off x="7692692" y="6906225"/>
+            <a:off x="6244564" y="5499988"/>
             <a:ext cx="346570" cy="276999"/>
           </a:xfrm>
           <a:prstGeom prst="rect">
@@ -6713,7 +6718,7 @@
         </p:nvSpPr>
         <p:spPr>
           <a:xfrm>
-            <a:off x="8739541" y="7690232"/>
+            <a:off x="7383611" y="6251121"/>
             <a:ext cx="389594" cy="276999"/>
           </a:xfrm>
           <a:prstGeom prst="rect">
@@ -6742,7 +6747,7 @@
         </p:nvSpPr>
         <p:spPr>
           <a:xfrm>
-            <a:off x="8699574" y="8070854"/>
+            <a:off x="6888311" y="6609045"/>
             <a:ext cx="914400" cy="612648"/>
           </a:xfrm>
           <a:prstGeom prst="flowChartProcess">
@@ -6790,9 +6795,9 @@
           <p:nvPr/>
         </p:nvCxnSpPr>
         <p:spPr>
-          <a:xfrm>
-            <a:off x="9129881" y="7628035"/>
-            <a:ext cx="26893" cy="442819"/>
+          <a:xfrm flipH="1">
+            <a:off x="7345511" y="6247047"/>
+            <a:ext cx="5788" cy="361998"/>
           </a:xfrm>
           <a:prstGeom prst="straightConnector1">
             <a:avLst/>
@@ -6827,8 +6832,8 @@
         </p:nvCxnSpPr>
         <p:spPr>
           <a:xfrm flipV="1">
-            <a:off x="9792692" y="5771100"/>
-            <a:ext cx="348533" cy="9782"/>
+            <a:off x="9792692" y="5776888"/>
+            <a:ext cx="348533" cy="3995"/>
           </a:xfrm>
           <a:prstGeom prst="straightConnector1">
             <a:avLst/>
@@ -6860,7 +6865,7 @@
         </p:nvSpPr>
         <p:spPr>
           <a:xfrm>
-            <a:off x="9708748" y="5499989"/>
+            <a:off x="9731896" y="5499989"/>
             <a:ext cx="389594" cy="276999"/>
           </a:xfrm>
           <a:prstGeom prst="rect">
@@ -6889,7 +6894,7 @@
         </p:nvSpPr>
         <p:spPr>
           <a:xfrm>
-            <a:off x="12124603" y="5457067"/>
+            <a:off x="12124603" y="5468641"/>
             <a:ext cx="914400" cy="612648"/>
           </a:xfrm>
           <a:prstGeom prst="flowChartProcess">
@@ -6938,8 +6943,8 @@
         </p:nvCxnSpPr>
         <p:spPr>
           <a:xfrm flipV="1">
-            <a:off x="11683155" y="5763392"/>
-            <a:ext cx="441448" cy="7709"/>
+            <a:off x="11683156" y="5774965"/>
+            <a:ext cx="441447" cy="1923"/>
           </a:xfrm>
           <a:prstGeom prst="straightConnector1">
             <a:avLst/>
@@ -7002,9 +7007,9 @@
           <p:nvPr/>
         </p:nvCxnSpPr>
         <p:spPr>
-          <a:xfrm>
-            <a:off x="10912190" y="6237265"/>
-            <a:ext cx="10328" cy="266771"/>
+          <a:xfrm flipH="1">
+            <a:off x="10912190" y="6243052"/>
+            <a:ext cx="1" cy="365993"/>
           </a:xfrm>
           <a:prstGeom prst="straightConnector1">
             <a:avLst/>
@@ -7039,12 +7044,12 @@
         </p:nvCxnSpPr>
         <p:spPr>
           <a:xfrm flipH="1">
-            <a:off x="11379719" y="5763391"/>
-            <a:ext cx="1659285" cy="1046968"/>
+            <a:off x="11369390" y="5774965"/>
+            <a:ext cx="1669613" cy="1140404"/>
           </a:xfrm>
           <a:prstGeom prst="bentConnector3">
             <a:avLst>
-              <a:gd name="adj1" fmla="val -13777"/>
+              <a:gd name="adj1" fmla="val -13692"/>
             </a:avLst>
           </a:prstGeom>
           <a:ln>
@@ -7225,153 +7230,6 @@
           </a:p>
         </p:txBody>
       </p:sp>
-      <p:sp>
-        <p:nvSpPr>
-          <p:cNvPr id="30" name="Flowchart: Decision 29"/>
-          <p:cNvSpPr/>
-          <p:nvPr/>
-        </p:nvSpPr>
-        <p:spPr>
-          <a:xfrm>
-            <a:off x="8390935" y="9074391"/>
-            <a:ext cx="1541931" cy="932329"/>
-          </a:xfrm>
-          <a:prstGeom prst="flowChartDecision">
-            <a:avLst/>
-          </a:prstGeom>
-        </p:spPr>
-        <p:style>
-          <a:lnRef idx="2">
-            <a:schemeClr val="accent6"/>
-          </a:lnRef>
-          <a:fillRef idx="1">
-            <a:schemeClr val="lt1"/>
-          </a:fillRef>
-          <a:effectRef idx="0">
-            <a:schemeClr val="accent6"/>
-          </a:effectRef>
-          <a:fontRef idx="minor">
-            <a:schemeClr val="dk1"/>
-          </a:fontRef>
-        </p:style>
-        <p:txBody>
-          <a:bodyPr rot="0" spcFirstLastPara="0" vertOverflow="overflow" horzOverflow="overflow" vert="horz" wrap="square" lIns="91440" tIns="45720" rIns="91440" bIns="45720" numCol="1" spcCol="0" rtlCol="0" fromWordArt="0" anchor="ctr" anchorCtr="0" forceAA="0" compatLnSpc="1">
-            <a:prstTxWarp prst="textNoShape">
-              <a:avLst/>
-            </a:prstTxWarp>
-            <a:noAutofit/>
-          </a:bodyPr>
-          <a:lstStyle/>
-          <a:p>
-            <a:pPr algn="ctr"/>
-            <a:r>
-              <a:rPr lang="en-GB" sz="1200" dirty="0"/>
-              <a:t>Is Feedback required?</a:t>
-            </a:r>
-          </a:p>
-        </p:txBody>
-      </p:sp>
-      <p:cxnSp>
-        <p:nvCxnSpPr>
-          <p:cNvPr id="31" name="Straight Arrow Connector 30"/>
-          <p:cNvCxnSpPr>
-            <a:stCxn id="17" idx="2"/>
-            <a:endCxn id="30" idx="0"/>
-          </p:cNvCxnSpPr>
-          <p:nvPr/>
-        </p:nvCxnSpPr>
-        <p:spPr>
-          <a:xfrm>
-            <a:off x="9156774" y="8683502"/>
-            <a:ext cx="5127" cy="390889"/>
-          </a:xfrm>
-          <a:prstGeom prst="straightConnector1">
-            <a:avLst/>
-          </a:prstGeom>
-          <a:ln>
-            <a:tailEnd type="triangle"/>
-          </a:ln>
-        </p:spPr>
-        <p:style>
-          <a:lnRef idx="1">
-            <a:schemeClr val="accent1"/>
-          </a:lnRef>
-          <a:fillRef idx="0">
-            <a:schemeClr val="accent1"/>
-          </a:fillRef>
-          <a:effectRef idx="0">
-            <a:schemeClr val="accent1"/>
-          </a:effectRef>
-          <a:fontRef idx="minor">
-            <a:schemeClr val="tx1"/>
-          </a:fontRef>
-        </p:style>
-      </p:cxnSp>
-      <p:sp>
-        <p:nvSpPr>
-          <p:cNvPr id="32" name="TextBox 31"/>
-          <p:cNvSpPr txBox="1"/>
-          <p:nvPr/>
-        </p:nvSpPr>
-        <p:spPr>
-          <a:xfrm>
-            <a:off x="8764976" y="10106659"/>
-            <a:ext cx="389594" cy="276999"/>
-          </a:xfrm>
-          <a:prstGeom prst="rect">
-            <a:avLst/>
-          </a:prstGeom>
-          <a:noFill/>
-        </p:spPr>
-        <p:txBody>
-          <a:bodyPr wrap="none" rtlCol="0">
-            <a:spAutoFit/>
-          </a:bodyPr>
-          <a:lstStyle/>
-          <a:p>
-            <a:r>
-              <a:rPr lang="en-GB" sz="1200" dirty="0"/>
-              <a:t>yes</a:t>
-            </a:r>
-          </a:p>
-        </p:txBody>
-      </p:sp>
-      <p:cxnSp>
-        <p:nvCxnSpPr>
-          <p:cNvPr id="33" name="Straight Arrow Connector 32"/>
-          <p:cNvCxnSpPr>
-            <a:stCxn id="30" idx="2"/>
-            <a:endCxn id="36" idx="0"/>
-          </p:cNvCxnSpPr>
-          <p:nvPr/>
-        </p:nvCxnSpPr>
-        <p:spPr>
-          <a:xfrm>
-            <a:off x="9161901" y="10006720"/>
-            <a:ext cx="5617" cy="586908"/>
-          </a:xfrm>
-          <a:prstGeom prst="straightConnector1">
-            <a:avLst/>
-          </a:prstGeom>
-          <a:ln>
-            <a:tailEnd type="triangle"/>
-          </a:ln>
-        </p:spPr>
-        <p:style>
-          <a:lnRef idx="1">
-            <a:schemeClr val="accent1"/>
-          </a:lnRef>
-          <a:fillRef idx="0">
-            <a:schemeClr val="accent1"/>
-          </a:fillRef>
-          <a:effectRef idx="0">
-            <a:schemeClr val="accent1"/>
-          </a:effectRef>
-          <a:fontRef idx="minor">
-            <a:schemeClr val="tx1"/>
-          </a:fontRef>
-        </p:style>
-      </p:cxnSp>
       <p:cxnSp>
         <p:nvCxnSpPr>
           <p:cNvPr id="34" name="Curved Connector 33"/>
@@ -7435,397 +7293,6 @@
             <a:r>
               <a:rPr lang="en-GB" sz="1200" dirty="0"/>
               <a:t>Stopped braking</a:t>
-            </a:r>
-          </a:p>
-        </p:txBody>
-      </p:sp>
-      <p:sp>
-        <p:nvSpPr>
-          <p:cNvPr id="36" name="Flowchart: Decision 35"/>
-          <p:cNvSpPr/>
-          <p:nvPr/>
-        </p:nvSpPr>
-        <p:spPr>
-          <a:xfrm>
-            <a:off x="8362360" y="10593628"/>
-            <a:ext cx="1610315" cy="1012584"/>
-          </a:xfrm>
-          <a:prstGeom prst="flowChartDecision">
-            <a:avLst/>
-          </a:prstGeom>
-        </p:spPr>
-        <p:style>
-          <a:lnRef idx="2">
-            <a:schemeClr val="accent6"/>
-          </a:lnRef>
-          <a:fillRef idx="1">
-            <a:schemeClr val="lt1"/>
-          </a:fillRef>
-          <a:effectRef idx="0">
-            <a:schemeClr val="accent6"/>
-          </a:effectRef>
-          <a:fontRef idx="minor">
-            <a:schemeClr val="dk1"/>
-          </a:fontRef>
-        </p:style>
-        <p:txBody>
-          <a:bodyPr rot="0" spcFirstLastPara="0" vertOverflow="overflow" horzOverflow="overflow" vert="horz" wrap="square" lIns="91440" tIns="45720" rIns="91440" bIns="45720" numCol="1" spcCol="0" rtlCol="0" fromWordArt="0" anchor="ctr" anchorCtr="0" forceAA="0" compatLnSpc="1">
-            <a:prstTxWarp prst="textNoShape">
-              <a:avLst/>
-            </a:prstTxWarp>
-            <a:noAutofit/>
-          </a:bodyPr>
-          <a:lstStyle/>
-          <a:p>
-            <a:pPr algn="ctr"/>
-            <a:r>
-              <a:rPr lang="en-GB" sz="1200" dirty="0" smtClean="0"/>
-              <a:t>Front slip &gt;= threshold</a:t>
-            </a:r>
-            <a:endParaRPr lang="en-GB" sz="1200" dirty="0"/>
-          </a:p>
-        </p:txBody>
-      </p:sp>
-      <p:sp>
-        <p:nvSpPr>
-          <p:cNvPr id="37" name="Flowchart: Process 36"/>
-          <p:cNvSpPr/>
-          <p:nvPr/>
-        </p:nvSpPr>
-        <p:spPr>
-          <a:xfrm>
-            <a:off x="6927924" y="12099929"/>
-            <a:ext cx="914400" cy="612648"/>
-          </a:xfrm>
-          <a:prstGeom prst="flowChartProcess">
-            <a:avLst/>
-          </a:prstGeom>
-        </p:spPr>
-        <p:style>
-          <a:lnRef idx="2">
-            <a:schemeClr val="accent6"/>
-          </a:lnRef>
-          <a:fillRef idx="1">
-            <a:schemeClr val="lt1"/>
-          </a:fillRef>
-          <a:effectRef idx="0">
-            <a:schemeClr val="accent6"/>
-          </a:effectRef>
-          <a:fontRef idx="minor">
-            <a:schemeClr val="dk1"/>
-          </a:fontRef>
-        </p:style>
-        <p:txBody>
-          <a:bodyPr rot="0" spcFirstLastPara="0" vertOverflow="overflow" horzOverflow="overflow" vert="horz" wrap="square" lIns="91440" tIns="45720" rIns="91440" bIns="45720" numCol="1" spcCol="0" rtlCol="0" fromWordArt="0" anchor="ctr" anchorCtr="0" forceAA="0" compatLnSpc="1">
-            <a:prstTxWarp prst="textNoShape">
-              <a:avLst/>
-            </a:prstTxWarp>
-            <a:noAutofit/>
-          </a:bodyPr>
-          <a:lstStyle/>
-          <a:p>
-            <a:pPr algn="ctr"/>
-            <a:r>
-              <a:rPr lang="en-GB" sz="1200" dirty="0" smtClean="0"/>
-              <a:t>Braking too light</a:t>
-            </a:r>
-            <a:endParaRPr lang="en-GB" sz="1200" dirty="0"/>
-          </a:p>
-        </p:txBody>
-      </p:sp>
-      <p:sp>
-        <p:nvSpPr>
-          <p:cNvPr id="38" name="Flowchart: Process 37"/>
-          <p:cNvSpPr/>
-          <p:nvPr/>
-        </p:nvSpPr>
-        <p:spPr>
-          <a:xfrm>
-            <a:off x="6951737" y="10795004"/>
-            <a:ext cx="914400" cy="612648"/>
-          </a:xfrm>
-          <a:prstGeom prst="flowChartProcess">
-            <a:avLst/>
-          </a:prstGeom>
-        </p:spPr>
-        <p:style>
-          <a:lnRef idx="2">
-            <a:schemeClr val="accent6"/>
-          </a:lnRef>
-          <a:fillRef idx="1">
-            <a:schemeClr val="lt1"/>
-          </a:fillRef>
-          <a:effectRef idx="0">
-            <a:schemeClr val="accent6"/>
-          </a:effectRef>
-          <a:fontRef idx="minor">
-            <a:schemeClr val="dk1"/>
-          </a:fontRef>
-        </p:style>
-        <p:txBody>
-          <a:bodyPr rot="0" spcFirstLastPara="0" vertOverflow="overflow" horzOverflow="overflow" vert="horz" wrap="square" lIns="91440" tIns="45720" rIns="91440" bIns="45720" numCol="1" spcCol="0" rtlCol="0" fromWordArt="0" anchor="ctr" anchorCtr="0" forceAA="0" compatLnSpc="1">
-            <a:prstTxWarp prst="textNoShape">
-              <a:avLst/>
-            </a:prstTxWarp>
-            <a:noAutofit/>
-          </a:bodyPr>
-          <a:lstStyle/>
-          <a:p>
-            <a:pPr algn="ctr"/>
-            <a:r>
-              <a:rPr lang="en-GB" sz="1200" dirty="0" smtClean="0"/>
-              <a:t>Braking too hard</a:t>
-            </a:r>
-            <a:endParaRPr lang="en-GB" sz="1200" dirty="0"/>
-          </a:p>
-        </p:txBody>
-      </p:sp>
-      <p:cxnSp>
-        <p:nvCxnSpPr>
-          <p:cNvPr id="39" name="Straight Arrow Connector 38"/>
-          <p:cNvCxnSpPr>
-            <a:stCxn id="36" idx="1"/>
-            <a:endCxn id="38" idx="3"/>
-          </p:cNvCxnSpPr>
-          <p:nvPr/>
-        </p:nvCxnSpPr>
-        <p:spPr>
-          <a:xfrm flipH="1">
-            <a:off x="7866137" y="11099920"/>
-            <a:ext cx="496223" cy="1408"/>
-          </a:xfrm>
-          <a:prstGeom prst="straightConnector1">
-            <a:avLst/>
-          </a:prstGeom>
-          <a:ln>
-            <a:tailEnd type="triangle"/>
-          </a:ln>
-        </p:spPr>
-        <p:style>
-          <a:lnRef idx="1">
-            <a:schemeClr val="accent1"/>
-          </a:lnRef>
-          <a:fillRef idx="0">
-            <a:schemeClr val="accent1"/>
-          </a:fillRef>
-          <a:effectRef idx="0">
-            <a:schemeClr val="accent1"/>
-          </a:effectRef>
-          <a:fontRef idx="minor">
-            <a:schemeClr val="tx1"/>
-          </a:fontRef>
-        </p:style>
-      </p:cxnSp>
-      <p:sp>
-        <p:nvSpPr>
-          <p:cNvPr id="40" name="Flowchart: Decision 39"/>
-          <p:cNvSpPr/>
-          <p:nvPr/>
-        </p:nvSpPr>
-        <p:spPr>
-          <a:xfrm>
-            <a:off x="8352835" y="11908078"/>
-            <a:ext cx="1610315" cy="1012584"/>
-          </a:xfrm>
-          <a:prstGeom prst="flowChartDecision">
-            <a:avLst/>
-          </a:prstGeom>
-        </p:spPr>
-        <p:style>
-          <a:lnRef idx="2">
-            <a:schemeClr val="accent6"/>
-          </a:lnRef>
-          <a:fillRef idx="1">
-            <a:schemeClr val="lt1"/>
-          </a:fillRef>
-          <a:effectRef idx="0">
-            <a:schemeClr val="accent6"/>
-          </a:effectRef>
-          <a:fontRef idx="minor">
-            <a:schemeClr val="dk1"/>
-          </a:fontRef>
-        </p:style>
-        <p:txBody>
-          <a:bodyPr rot="0" spcFirstLastPara="0" vertOverflow="overflow" horzOverflow="overflow" vert="horz" wrap="square" lIns="91440" tIns="45720" rIns="91440" bIns="45720" numCol="1" spcCol="0" rtlCol="0" fromWordArt="0" anchor="ctr" anchorCtr="0" forceAA="0" compatLnSpc="1">
-            <a:prstTxWarp prst="textNoShape">
-              <a:avLst/>
-            </a:prstTxWarp>
-            <a:noAutofit/>
-          </a:bodyPr>
-          <a:lstStyle/>
-          <a:p>
-            <a:pPr algn="ctr"/>
-            <a:r>
-              <a:rPr lang="en-GB" sz="1200" dirty="0" smtClean="0"/>
-              <a:t>Front slip </a:t>
-            </a:r>
-            <a:r>
-              <a:rPr lang="en-GB" sz="1200" dirty="0" smtClean="0"/>
-              <a:t>&lt;= </a:t>
-            </a:r>
-            <a:r>
-              <a:rPr lang="en-GB" sz="1200" dirty="0" smtClean="0"/>
-              <a:t>threshold</a:t>
-            </a:r>
-            <a:endParaRPr lang="en-GB" sz="1200" dirty="0"/>
-          </a:p>
-        </p:txBody>
-      </p:sp>
-      <p:cxnSp>
-        <p:nvCxnSpPr>
-          <p:cNvPr id="41" name="Straight Arrow Connector 40"/>
-          <p:cNvCxnSpPr>
-            <a:stCxn id="36" idx="2"/>
-            <a:endCxn id="40" idx="0"/>
-          </p:cNvCxnSpPr>
-          <p:nvPr/>
-        </p:nvCxnSpPr>
-        <p:spPr>
-          <a:xfrm flipH="1">
-            <a:off x="9157993" y="11606212"/>
-            <a:ext cx="9525" cy="301866"/>
-          </a:xfrm>
-          <a:prstGeom prst="straightConnector1">
-            <a:avLst/>
-          </a:prstGeom>
-          <a:ln>
-            <a:tailEnd type="triangle"/>
-          </a:ln>
-        </p:spPr>
-        <p:style>
-          <a:lnRef idx="1">
-            <a:schemeClr val="accent1"/>
-          </a:lnRef>
-          <a:fillRef idx="0">
-            <a:schemeClr val="accent1"/>
-          </a:fillRef>
-          <a:effectRef idx="0">
-            <a:schemeClr val="accent1"/>
-          </a:effectRef>
-          <a:fontRef idx="minor">
-            <a:schemeClr val="tx1"/>
-          </a:fontRef>
-        </p:style>
-      </p:cxnSp>
-      <p:cxnSp>
-        <p:nvCxnSpPr>
-          <p:cNvPr id="42" name="Straight Arrow Connector 41"/>
-          <p:cNvCxnSpPr>
-            <a:stCxn id="40" idx="1"/>
-            <a:endCxn id="37" idx="3"/>
-          </p:cNvCxnSpPr>
-          <p:nvPr/>
-        </p:nvCxnSpPr>
-        <p:spPr>
-          <a:xfrm flipH="1" flipV="1">
-            <a:off x="7842324" y="12406253"/>
-            <a:ext cx="510511" cy="8117"/>
-          </a:xfrm>
-          <a:prstGeom prst="straightConnector1">
-            <a:avLst/>
-          </a:prstGeom>
-          <a:ln>
-            <a:tailEnd type="triangle"/>
-          </a:ln>
-        </p:spPr>
-        <p:style>
-          <a:lnRef idx="1">
-            <a:schemeClr val="accent1"/>
-          </a:lnRef>
-          <a:fillRef idx="0">
-            <a:schemeClr val="accent1"/>
-          </a:fillRef>
-          <a:effectRef idx="0">
-            <a:schemeClr val="accent1"/>
-          </a:effectRef>
-          <a:fontRef idx="minor">
-            <a:schemeClr val="tx1"/>
-          </a:fontRef>
-        </p:style>
-      </p:cxnSp>
-      <p:sp>
-        <p:nvSpPr>
-          <p:cNvPr id="43" name="TextBox 42"/>
-          <p:cNvSpPr txBox="1"/>
-          <p:nvPr/>
-        </p:nvSpPr>
-        <p:spPr>
-          <a:xfrm>
-            <a:off x="7964876" y="10843259"/>
-            <a:ext cx="389594" cy="276999"/>
-          </a:xfrm>
-          <a:prstGeom prst="rect">
-            <a:avLst/>
-          </a:prstGeom>
-          <a:noFill/>
-        </p:spPr>
-        <p:txBody>
-          <a:bodyPr wrap="none" rtlCol="0">
-            <a:spAutoFit/>
-          </a:bodyPr>
-          <a:lstStyle/>
-          <a:p>
-            <a:r>
-              <a:rPr lang="en-GB" sz="1200" dirty="0"/>
-              <a:t>yes</a:t>
-            </a:r>
-          </a:p>
-        </p:txBody>
-      </p:sp>
-      <p:sp>
-        <p:nvSpPr>
-          <p:cNvPr id="44" name="TextBox 43"/>
-          <p:cNvSpPr txBox="1"/>
-          <p:nvPr/>
-        </p:nvSpPr>
-        <p:spPr>
-          <a:xfrm>
-            <a:off x="7952176" y="12113259"/>
-            <a:ext cx="389594" cy="276999"/>
-          </a:xfrm>
-          <a:prstGeom prst="rect">
-            <a:avLst/>
-          </a:prstGeom>
-          <a:noFill/>
-        </p:spPr>
-        <p:txBody>
-          <a:bodyPr wrap="none" rtlCol="0">
-            <a:spAutoFit/>
-          </a:bodyPr>
-          <a:lstStyle/>
-          <a:p>
-            <a:r>
-              <a:rPr lang="en-GB" sz="1200" dirty="0"/>
-              <a:t>yes</a:t>
-            </a:r>
-          </a:p>
-        </p:txBody>
-      </p:sp>
-      <p:sp>
-        <p:nvSpPr>
-          <p:cNvPr id="45" name="TextBox 44"/>
-          <p:cNvSpPr txBox="1"/>
-          <p:nvPr/>
-        </p:nvSpPr>
-        <p:spPr>
-          <a:xfrm>
-            <a:off x="8759492" y="11554425"/>
-            <a:ext cx="346570" cy="276999"/>
-          </a:xfrm>
-          <a:prstGeom prst="rect">
-            <a:avLst/>
-          </a:prstGeom>
-          <a:noFill/>
-        </p:spPr>
-        <p:txBody>
-          <a:bodyPr wrap="none" rtlCol="0">
-            <a:spAutoFit/>
-          </a:bodyPr>
-          <a:lstStyle/>
-          <a:p>
-            <a:r>
-              <a:rPr lang="en-GB" sz="1200" dirty="0"/>
-              <a:t>no</a:t>
             </a:r>
           </a:p>
         </p:txBody>

</xml_diff>

<commit_message>
Fixed typos, broken refs and other things
</commit_message>
<xml_diff>
--- a/Write Up/Power Point/Dia.pptx
+++ b/Write Up/Power Point/Dia.pptx
@@ -10,6 +10,8 @@
     <p:sldId id="258" r:id="rId4"/>
     <p:sldId id="259" r:id="rId5"/>
     <p:sldId id="260" r:id="rId6"/>
+    <p:sldId id="261" r:id="rId7"/>
+    <p:sldId id="262" r:id="rId8"/>
   </p:sldIdLst>
   <p:sldSz cx="18000663" cy="18000663"/>
   <p:notesSz cx="6858000" cy="9144000"/>
@@ -247,7 +249,7 @@
           <a:p>
             <a:fld id="{BD70A680-B69F-474D-ADF6-DA601AAC90FA}" type="datetimeFigureOut">
               <a:rPr lang="en-GB" smtClean="0"/>
-              <a:t>26/05/2016</a:t>
+              <a:t>27/05/2016</a:t>
             </a:fld>
             <a:endParaRPr lang="en-GB"/>
           </a:p>
@@ -417,7 +419,7 @@
           <a:p>
             <a:fld id="{BD70A680-B69F-474D-ADF6-DA601AAC90FA}" type="datetimeFigureOut">
               <a:rPr lang="en-GB" smtClean="0"/>
-              <a:t>26/05/2016</a:t>
+              <a:t>27/05/2016</a:t>
             </a:fld>
             <a:endParaRPr lang="en-GB"/>
           </a:p>
@@ -597,7 +599,7 @@
           <a:p>
             <a:fld id="{BD70A680-B69F-474D-ADF6-DA601AAC90FA}" type="datetimeFigureOut">
               <a:rPr lang="en-GB" smtClean="0"/>
-              <a:t>26/05/2016</a:t>
+              <a:t>27/05/2016</a:t>
             </a:fld>
             <a:endParaRPr lang="en-GB"/>
           </a:p>
@@ -767,7 +769,7 @@
           <a:p>
             <a:fld id="{BD70A680-B69F-474D-ADF6-DA601AAC90FA}" type="datetimeFigureOut">
               <a:rPr lang="en-GB" smtClean="0"/>
-              <a:t>26/05/2016</a:t>
+              <a:t>27/05/2016</a:t>
             </a:fld>
             <a:endParaRPr lang="en-GB"/>
           </a:p>
@@ -1011,7 +1013,7 @@
           <a:p>
             <a:fld id="{BD70A680-B69F-474D-ADF6-DA601AAC90FA}" type="datetimeFigureOut">
               <a:rPr lang="en-GB" smtClean="0"/>
-              <a:t>26/05/2016</a:t>
+              <a:t>27/05/2016</a:t>
             </a:fld>
             <a:endParaRPr lang="en-GB"/>
           </a:p>
@@ -1243,7 +1245,7 @@
           <a:p>
             <a:fld id="{BD70A680-B69F-474D-ADF6-DA601AAC90FA}" type="datetimeFigureOut">
               <a:rPr lang="en-GB" smtClean="0"/>
-              <a:t>26/05/2016</a:t>
+              <a:t>27/05/2016</a:t>
             </a:fld>
             <a:endParaRPr lang="en-GB"/>
           </a:p>
@@ -1610,7 +1612,7 @@
           <a:p>
             <a:fld id="{BD70A680-B69F-474D-ADF6-DA601AAC90FA}" type="datetimeFigureOut">
               <a:rPr lang="en-GB" smtClean="0"/>
-              <a:t>26/05/2016</a:t>
+              <a:t>27/05/2016</a:t>
             </a:fld>
             <a:endParaRPr lang="en-GB"/>
           </a:p>
@@ -1728,7 +1730,7 @@
           <a:p>
             <a:fld id="{BD70A680-B69F-474D-ADF6-DA601AAC90FA}" type="datetimeFigureOut">
               <a:rPr lang="en-GB" smtClean="0"/>
-              <a:t>26/05/2016</a:t>
+              <a:t>27/05/2016</a:t>
             </a:fld>
             <a:endParaRPr lang="en-GB"/>
           </a:p>
@@ -1823,7 +1825,7 @@
           <a:p>
             <a:fld id="{BD70A680-B69F-474D-ADF6-DA601AAC90FA}" type="datetimeFigureOut">
               <a:rPr lang="en-GB" smtClean="0"/>
-              <a:t>26/05/2016</a:t>
+              <a:t>27/05/2016</a:t>
             </a:fld>
             <a:endParaRPr lang="en-GB"/>
           </a:p>
@@ -2100,7 +2102,7 @@
           <a:p>
             <a:fld id="{BD70A680-B69F-474D-ADF6-DA601AAC90FA}" type="datetimeFigureOut">
               <a:rPr lang="en-GB" smtClean="0"/>
-              <a:t>26/05/2016</a:t>
+              <a:t>27/05/2016</a:t>
             </a:fld>
             <a:endParaRPr lang="en-GB"/>
           </a:p>
@@ -2357,7 +2359,7 @@
           <a:p>
             <a:fld id="{BD70A680-B69F-474D-ADF6-DA601AAC90FA}" type="datetimeFigureOut">
               <a:rPr lang="en-GB" smtClean="0"/>
-              <a:t>26/05/2016</a:t>
+              <a:t>27/05/2016</a:t>
             </a:fld>
             <a:endParaRPr lang="en-GB"/>
           </a:p>
@@ -2570,7 +2572,7 @@
           <a:p>
             <a:fld id="{BD70A680-B69F-474D-ADF6-DA601AAC90FA}" type="datetimeFigureOut">
               <a:rPr lang="en-GB" smtClean="0"/>
-              <a:t>26/05/2016</a:t>
+              <a:t>27/05/2016</a:t>
             </a:fld>
             <a:endParaRPr lang="en-GB"/>
           </a:p>
@@ -7306,6 +7308,2077 @@
 </p:sld>
 </file>
 
+<file path=ppt/slides/slide6.xml><?xml version="1.0" encoding="utf-8"?>
+<p:sld xmlns:a="http://schemas.openxmlformats.org/drawingml/2006/main" xmlns:r="http://schemas.openxmlformats.org/officeDocument/2006/relationships" xmlns:p="http://schemas.openxmlformats.org/presentationml/2006/main">
+  <p:cSld>
+    <p:spTree>
+      <p:nvGrpSpPr>
+        <p:cNvPr id="1" name=""/>
+        <p:cNvGrpSpPr/>
+        <p:nvPr/>
+      </p:nvGrpSpPr>
+      <p:grpSpPr>
+        <a:xfrm>
+          <a:off x="0" y="0"/>
+          <a:ext cx="0" cy="0"/>
+          <a:chOff x="0" y="0"/>
+          <a:chExt cx="0" cy="0"/>
+        </a:xfrm>
+      </p:grpSpPr>
+      <p:sp>
+        <p:nvSpPr>
+          <p:cNvPr id="80" name="Rectangle 79"/>
+          <p:cNvSpPr/>
+          <p:nvPr/>
+        </p:nvSpPr>
+        <p:spPr>
+          <a:xfrm>
+            <a:off x="1768900" y="152946"/>
+            <a:ext cx="3657600" cy="4676140"/>
+          </a:xfrm>
+          <a:prstGeom prst="rect">
+            <a:avLst/>
+          </a:prstGeom>
+          <a:noFill/>
+        </p:spPr>
+        <p:style>
+          <a:lnRef idx="2">
+            <a:schemeClr val="accent6"/>
+          </a:lnRef>
+          <a:fillRef idx="1">
+            <a:schemeClr val="lt1"/>
+          </a:fillRef>
+          <a:effectRef idx="0">
+            <a:schemeClr val="accent6"/>
+          </a:effectRef>
+          <a:fontRef idx="minor">
+            <a:schemeClr val="dk1"/>
+          </a:fontRef>
+        </p:style>
+        <p:txBody>
+          <a:bodyPr rtlCol="0" anchor="ctr"/>
+          <a:lstStyle/>
+          <a:p>
+            <a:pPr algn="ctr"/>
+            <a:endParaRPr lang="en-GB"/>
+          </a:p>
+        </p:txBody>
+      </p:sp>
+      <p:sp>
+        <p:nvSpPr>
+          <p:cNvPr id="81" name="Rectangle 80"/>
+          <p:cNvSpPr/>
+          <p:nvPr/>
+        </p:nvSpPr>
+        <p:spPr>
+          <a:xfrm>
+            <a:off x="196704" y="670755"/>
+            <a:ext cx="1273956" cy="344724"/>
+          </a:xfrm>
+          <a:prstGeom prst="rect">
+            <a:avLst/>
+          </a:prstGeom>
+        </p:spPr>
+        <p:style>
+          <a:lnRef idx="2">
+            <a:schemeClr val="accent6"/>
+          </a:lnRef>
+          <a:fillRef idx="1">
+            <a:schemeClr val="lt1"/>
+          </a:fillRef>
+          <a:effectRef idx="0">
+            <a:schemeClr val="accent6"/>
+          </a:effectRef>
+          <a:fontRef idx="minor">
+            <a:schemeClr val="dk1"/>
+          </a:fontRef>
+        </p:style>
+        <p:txBody>
+          <a:bodyPr rtlCol="0" anchor="ctr"/>
+          <a:lstStyle/>
+          <a:p>
+            <a:pPr algn="ctr"/>
+            <a:endParaRPr lang="en-GB" sz="1400"/>
+          </a:p>
+        </p:txBody>
+      </p:sp>
+      <p:sp>
+        <p:nvSpPr>
+          <p:cNvPr id="82" name="TextBox 81"/>
+          <p:cNvSpPr txBox="1"/>
+          <p:nvPr/>
+        </p:nvSpPr>
+        <p:spPr>
+          <a:xfrm>
+            <a:off x="208890" y="681474"/>
+            <a:ext cx="1261769" cy="276999"/>
+          </a:xfrm>
+          <a:prstGeom prst="rect">
+            <a:avLst/>
+          </a:prstGeom>
+          <a:noFill/>
+        </p:spPr>
+        <p:txBody>
+          <a:bodyPr wrap="square" rtlCol="0">
+            <a:spAutoFit/>
+          </a:bodyPr>
+          <a:lstStyle/>
+          <a:p>
+            <a:pPr algn="ctr"/>
+            <a:r>
+              <a:rPr lang="en-GB" sz="1200" dirty="0" smtClean="0"/>
+              <a:t>Sim racing game</a:t>
+            </a:r>
+            <a:endParaRPr lang="en-GB" sz="1200" dirty="0"/>
+          </a:p>
+        </p:txBody>
+      </p:sp>
+      <p:sp>
+        <p:nvSpPr>
+          <p:cNvPr id="83" name="Rectangle 82"/>
+          <p:cNvSpPr/>
+          <p:nvPr/>
+        </p:nvSpPr>
+        <p:spPr>
+          <a:xfrm>
+            <a:off x="201626" y="1900043"/>
+            <a:ext cx="1269033" cy="344697"/>
+          </a:xfrm>
+          <a:prstGeom prst="rect">
+            <a:avLst/>
+          </a:prstGeom>
+        </p:spPr>
+        <p:style>
+          <a:lnRef idx="2">
+            <a:schemeClr val="accent6"/>
+          </a:lnRef>
+          <a:fillRef idx="1">
+            <a:schemeClr val="lt1"/>
+          </a:fillRef>
+          <a:effectRef idx="0">
+            <a:schemeClr val="accent6"/>
+          </a:effectRef>
+          <a:fontRef idx="minor">
+            <a:schemeClr val="dk1"/>
+          </a:fontRef>
+        </p:style>
+        <p:txBody>
+          <a:bodyPr rtlCol="0" anchor="ctr"/>
+          <a:lstStyle/>
+          <a:p>
+            <a:pPr algn="ctr"/>
+            <a:endParaRPr lang="en-GB" sz="1400"/>
+          </a:p>
+        </p:txBody>
+      </p:sp>
+      <p:sp>
+        <p:nvSpPr>
+          <p:cNvPr id="84" name="TextBox 83"/>
+          <p:cNvSpPr txBox="1"/>
+          <p:nvPr/>
+        </p:nvSpPr>
+        <p:spPr>
+          <a:xfrm>
+            <a:off x="201626" y="1905581"/>
+            <a:ext cx="1269033" cy="276999"/>
+          </a:xfrm>
+          <a:prstGeom prst="rect">
+            <a:avLst/>
+          </a:prstGeom>
+          <a:noFill/>
+        </p:spPr>
+        <p:txBody>
+          <a:bodyPr wrap="square" rtlCol="0">
+            <a:spAutoFit/>
+          </a:bodyPr>
+          <a:lstStyle/>
+          <a:p>
+            <a:pPr algn="ctr"/>
+            <a:r>
+              <a:rPr lang="en-GB" sz="1200" dirty="0" smtClean="0"/>
+              <a:t>Sim Racing Rig</a:t>
+            </a:r>
+            <a:endParaRPr lang="en-GB" sz="1200" dirty="0"/>
+          </a:p>
+        </p:txBody>
+      </p:sp>
+      <p:sp>
+        <p:nvSpPr>
+          <p:cNvPr id="85" name="Right Arrow 84"/>
+          <p:cNvSpPr/>
+          <p:nvPr/>
+        </p:nvSpPr>
+        <p:spPr>
+          <a:xfrm rot="5400000">
+            <a:off x="413118" y="1324949"/>
+            <a:ext cx="685124" cy="190888"/>
+          </a:xfrm>
+          <a:prstGeom prst="rightArrow">
+            <a:avLst>
+              <a:gd name="adj1" fmla="val 27725"/>
+              <a:gd name="adj2" fmla="val 71123"/>
+            </a:avLst>
+          </a:prstGeom>
+        </p:spPr>
+        <p:style>
+          <a:lnRef idx="2">
+            <a:schemeClr val="accent1">
+              <a:shade val="50000"/>
+            </a:schemeClr>
+          </a:lnRef>
+          <a:fillRef idx="1">
+            <a:schemeClr val="accent1"/>
+          </a:fillRef>
+          <a:effectRef idx="0">
+            <a:schemeClr val="accent1"/>
+          </a:effectRef>
+          <a:fontRef idx="minor">
+            <a:schemeClr val="lt1"/>
+          </a:fontRef>
+        </p:style>
+        <p:txBody>
+          <a:bodyPr rtlCol="0" anchor="ctr"/>
+          <a:lstStyle/>
+          <a:p>
+            <a:pPr algn="ctr"/>
+            <a:endParaRPr lang="en-GB" dirty="0"/>
+          </a:p>
+        </p:txBody>
+      </p:sp>
+      <p:sp>
+        <p:nvSpPr>
+          <p:cNvPr id="86" name="TextBox 85"/>
+          <p:cNvSpPr txBox="1"/>
+          <p:nvPr/>
+        </p:nvSpPr>
+        <p:spPr>
+          <a:xfrm>
+            <a:off x="113136" y="1210591"/>
+            <a:ext cx="630301" cy="369332"/>
+          </a:xfrm>
+          <a:prstGeom prst="rect">
+            <a:avLst/>
+          </a:prstGeom>
+          <a:noFill/>
+        </p:spPr>
+        <p:txBody>
+          <a:bodyPr wrap="none" rtlCol="0">
+            <a:spAutoFit/>
+          </a:bodyPr>
+          <a:lstStyle/>
+          <a:p>
+            <a:pPr algn="ctr"/>
+            <a:r>
+              <a:rPr lang="en-GB" sz="900" dirty="0" smtClean="0"/>
+              <a:t>Force </a:t>
+            </a:r>
+          </a:p>
+          <a:p>
+            <a:pPr algn="ctr"/>
+            <a:r>
+              <a:rPr lang="en-GB" sz="900" dirty="0" smtClean="0"/>
+              <a:t>Feedback</a:t>
+            </a:r>
+            <a:endParaRPr lang="en-GB" sz="900" dirty="0"/>
+          </a:p>
+        </p:txBody>
+      </p:sp>
+      <p:sp>
+        <p:nvSpPr>
+          <p:cNvPr id="87" name="Right Arrow 86"/>
+          <p:cNvSpPr/>
+          <p:nvPr/>
+        </p:nvSpPr>
+        <p:spPr>
+          <a:xfrm rot="16200000">
+            <a:off x="704370" y="1334173"/>
+            <a:ext cx="666677" cy="190888"/>
+          </a:xfrm>
+          <a:prstGeom prst="rightArrow">
+            <a:avLst>
+              <a:gd name="adj1" fmla="val 27725"/>
+              <a:gd name="adj2" fmla="val 71123"/>
+            </a:avLst>
+          </a:prstGeom>
+        </p:spPr>
+        <p:style>
+          <a:lnRef idx="2">
+            <a:schemeClr val="accent1">
+              <a:shade val="50000"/>
+            </a:schemeClr>
+          </a:lnRef>
+          <a:fillRef idx="1">
+            <a:schemeClr val="accent1"/>
+          </a:fillRef>
+          <a:effectRef idx="0">
+            <a:schemeClr val="accent1"/>
+          </a:effectRef>
+          <a:fontRef idx="minor">
+            <a:schemeClr val="lt1"/>
+          </a:fontRef>
+        </p:style>
+        <p:txBody>
+          <a:bodyPr rtlCol="0" anchor="ctr"/>
+          <a:lstStyle/>
+          <a:p>
+            <a:pPr algn="ctr"/>
+            <a:endParaRPr lang="en-GB" dirty="0"/>
+          </a:p>
+        </p:txBody>
+      </p:sp>
+      <p:sp>
+        <p:nvSpPr>
+          <p:cNvPr id="88" name="TextBox 87"/>
+          <p:cNvSpPr txBox="1"/>
+          <p:nvPr/>
+        </p:nvSpPr>
+        <p:spPr>
+          <a:xfrm>
+            <a:off x="1079599" y="1304369"/>
+            <a:ext cx="579005" cy="230832"/>
+          </a:xfrm>
+          <a:prstGeom prst="rect">
+            <a:avLst/>
+          </a:prstGeom>
+          <a:noFill/>
+        </p:spPr>
+        <p:txBody>
+          <a:bodyPr wrap="none" rtlCol="0">
+            <a:spAutoFit/>
+          </a:bodyPr>
+          <a:lstStyle/>
+          <a:p>
+            <a:pPr algn="ctr"/>
+            <a:r>
+              <a:rPr lang="en-GB" sz="900" dirty="0" smtClean="0"/>
+              <a:t>Controls</a:t>
+            </a:r>
+            <a:endParaRPr lang="en-GB" sz="900" dirty="0"/>
+          </a:p>
+        </p:txBody>
+      </p:sp>
+      <p:sp>
+        <p:nvSpPr>
+          <p:cNvPr id="89" name="TextBox 88"/>
+          <p:cNvSpPr txBox="1"/>
+          <p:nvPr/>
+        </p:nvSpPr>
+        <p:spPr>
+          <a:xfrm>
+            <a:off x="1768900" y="122193"/>
+            <a:ext cx="3657600" cy="369332"/>
+          </a:xfrm>
+          <a:prstGeom prst="rect">
+            <a:avLst/>
+          </a:prstGeom>
+          <a:noFill/>
+        </p:spPr>
+        <p:txBody>
+          <a:bodyPr wrap="square" rtlCol="0">
+            <a:spAutoFit/>
+          </a:bodyPr>
+          <a:lstStyle/>
+          <a:p>
+            <a:pPr algn="ctr"/>
+            <a:r>
+              <a:rPr lang="en-GB" dirty="0" err="1" smtClean="0"/>
+              <a:t>TeAR</a:t>
+            </a:r>
+            <a:endParaRPr lang="en-GB" dirty="0" smtClean="0"/>
+          </a:p>
+        </p:txBody>
+      </p:sp>
+      <p:sp>
+        <p:nvSpPr>
+          <p:cNvPr id="90" name="Rectangle 89"/>
+          <p:cNvSpPr/>
+          <p:nvPr/>
+        </p:nvSpPr>
+        <p:spPr>
+          <a:xfrm>
+            <a:off x="1945711" y="598585"/>
+            <a:ext cx="1340270" cy="741925"/>
+          </a:xfrm>
+          <a:prstGeom prst="rect">
+            <a:avLst/>
+          </a:prstGeom>
+        </p:spPr>
+        <p:style>
+          <a:lnRef idx="2">
+            <a:schemeClr val="accent6"/>
+          </a:lnRef>
+          <a:fillRef idx="1">
+            <a:schemeClr val="lt1"/>
+          </a:fillRef>
+          <a:effectRef idx="0">
+            <a:schemeClr val="accent6"/>
+          </a:effectRef>
+          <a:fontRef idx="minor">
+            <a:schemeClr val="dk1"/>
+          </a:fontRef>
+        </p:style>
+        <p:txBody>
+          <a:bodyPr rtlCol="0" anchor="ctr"/>
+          <a:lstStyle/>
+          <a:p>
+            <a:pPr algn="ctr"/>
+            <a:r>
+              <a:rPr lang="en-GB" sz="1400" dirty="0" smtClean="0"/>
+              <a:t>Telemetry Input Interface</a:t>
+            </a:r>
+            <a:endParaRPr lang="en-GB" sz="1400" dirty="0"/>
+          </a:p>
+        </p:txBody>
+      </p:sp>
+      <p:sp>
+        <p:nvSpPr>
+          <p:cNvPr id="91" name="Rectangle 90"/>
+          <p:cNvSpPr/>
+          <p:nvPr/>
+        </p:nvSpPr>
+        <p:spPr>
+          <a:xfrm>
+            <a:off x="1930321" y="2122875"/>
+            <a:ext cx="1340270" cy="1393587"/>
+          </a:xfrm>
+          <a:prstGeom prst="rect">
+            <a:avLst/>
+          </a:prstGeom>
+        </p:spPr>
+        <p:style>
+          <a:lnRef idx="2">
+            <a:schemeClr val="accent6"/>
+          </a:lnRef>
+          <a:fillRef idx="1">
+            <a:schemeClr val="lt1"/>
+          </a:fillRef>
+          <a:effectRef idx="0">
+            <a:schemeClr val="accent6"/>
+          </a:effectRef>
+          <a:fontRef idx="minor">
+            <a:schemeClr val="dk1"/>
+          </a:fontRef>
+        </p:style>
+        <p:txBody>
+          <a:bodyPr rtlCol="0" anchor="ctr"/>
+          <a:lstStyle/>
+          <a:p>
+            <a:pPr algn="ctr"/>
+            <a:endParaRPr lang="en-GB" sz="1400" dirty="0"/>
+          </a:p>
+        </p:txBody>
+      </p:sp>
+      <p:sp>
+        <p:nvSpPr>
+          <p:cNvPr id="92" name="TextBox 91"/>
+          <p:cNvSpPr txBox="1"/>
+          <p:nvPr/>
+        </p:nvSpPr>
+        <p:spPr>
+          <a:xfrm>
+            <a:off x="1930321" y="2216036"/>
+            <a:ext cx="1340270" cy="307777"/>
+          </a:xfrm>
+          <a:prstGeom prst="rect">
+            <a:avLst/>
+          </a:prstGeom>
+          <a:noFill/>
+        </p:spPr>
+        <p:txBody>
+          <a:bodyPr wrap="square" rtlCol="0">
+            <a:spAutoFit/>
+          </a:bodyPr>
+          <a:lstStyle/>
+          <a:p>
+            <a:pPr algn="ctr"/>
+            <a:r>
+              <a:rPr lang="en-GB" sz="1400" dirty="0" smtClean="0"/>
+              <a:t>Processing</a:t>
+            </a:r>
+            <a:endParaRPr lang="en-GB" dirty="0" smtClean="0"/>
+          </a:p>
+        </p:txBody>
+      </p:sp>
+      <p:sp>
+        <p:nvSpPr>
+          <p:cNvPr id="93" name="Rectangle 92"/>
+          <p:cNvSpPr/>
+          <p:nvPr/>
+        </p:nvSpPr>
+        <p:spPr>
+          <a:xfrm>
+            <a:off x="2067732" y="2523813"/>
+            <a:ext cx="1088135" cy="843493"/>
+          </a:xfrm>
+          <a:prstGeom prst="rect">
+            <a:avLst/>
+          </a:prstGeom>
+        </p:spPr>
+        <p:style>
+          <a:lnRef idx="2">
+            <a:schemeClr val="accent6"/>
+          </a:lnRef>
+          <a:fillRef idx="1">
+            <a:schemeClr val="lt1"/>
+          </a:fillRef>
+          <a:effectRef idx="0">
+            <a:schemeClr val="accent6"/>
+          </a:effectRef>
+          <a:fontRef idx="minor">
+            <a:schemeClr val="dk1"/>
+          </a:fontRef>
+        </p:style>
+        <p:txBody>
+          <a:bodyPr rtlCol="0" anchor="ctr"/>
+          <a:lstStyle/>
+          <a:p>
+            <a:pPr algn="ctr"/>
+            <a:r>
+              <a:rPr lang="en-GB" sz="1400" dirty="0" smtClean="0"/>
+              <a:t>Telemetry Consumers</a:t>
+            </a:r>
+            <a:endParaRPr lang="en-GB" sz="1400" dirty="0"/>
+          </a:p>
+        </p:txBody>
+      </p:sp>
+      <p:sp>
+        <p:nvSpPr>
+          <p:cNvPr id="94" name="Rectangle 93"/>
+          <p:cNvSpPr/>
+          <p:nvPr/>
+        </p:nvSpPr>
+        <p:spPr>
+          <a:xfrm>
+            <a:off x="1930321" y="4087374"/>
+            <a:ext cx="1340270" cy="509719"/>
+          </a:xfrm>
+          <a:prstGeom prst="rect">
+            <a:avLst/>
+          </a:prstGeom>
+        </p:spPr>
+        <p:style>
+          <a:lnRef idx="2">
+            <a:schemeClr val="accent6"/>
+          </a:lnRef>
+          <a:fillRef idx="1">
+            <a:schemeClr val="lt1"/>
+          </a:fillRef>
+          <a:effectRef idx="0">
+            <a:schemeClr val="accent6"/>
+          </a:effectRef>
+          <a:fontRef idx="minor">
+            <a:schemeClr val="dk1"/>
+          </a:fontRef>
+        </p:style>
+        <p:txBody>
+          <a:bodyPr rtlCol="0" anchor="ctr"/>
+          <a:lstStyle/>
+          <a:p>
+            <a:pPr algn="ctr"/>
+            <a:r>
+              <a:rPr lang="en-GB" sz="1400" dirty="0" smtClean="0"/>
+              <a:t>Output Interface</a:t>
+            </a:r>
+            <a:endParaRPr lang="en-GB" sz="1400" dirty="0"/>
+          </a:p>
+        </p:txBody>
+      </p:sp>
+      <p:sp>
+        <p:nvSpPr>
+          <p:cNvPr id="95" name="Flowchart: Multidocument 94"/>
+          <p:cNvSpPr/>
+          <p:nvPr/>
+        </p:nvSpPr>
+        <p:spPr>
+          <a:xfrm>
+            <a:off x="4273306" y="590336"/>
+            <a:ext cx="1004101" cy="811856"/>
+          </a:xfrm>
+          <a:prstGeom prst="flowChartMultidocument">
+            <a:avLst/>
+          </a:prstGeom>
+        </p:spPr>
+        <p:style>
+          <a:lnRef idx="2">
+            <a:schemeClr val="accent6"/>
+          </a:lnRef>
+          <a:fillRef idx="1">
+            <a:schemeClr val="lt1"/>
+          </a:fillRef>
+          <a:effectRef idx="0">
+            <a:schemeClr val="accent6"/>
+          </a:effectRef>
+          <a:fontRef idx="minor">
+            <a:schemeClr val="dk1"/>
+          </a:fontRef>
+        </p:style>
+        <p:txBody>
+          <a:bodyPr rtlCol="0" anchor="ctr"/>
+          <a:lstStyle/>
+          <a:p>
+            <a:pPr algn="ctr"/>
+            <a:r>
+              <a:rPr lang="en-GB" sz="1200" dirty="0" smtClean="0"/>
+              <a:t>Supporting Files</a:t>
+            </a:r>
+            <a:endParaRPr lang="en-GB" sz="1200" dirty="0"/>
+          </a:p>
+        </p:txBody>
+      </p:sp>
+      <p:pic>
+        <p:nvPicPr>
+          <p:cNvPr id="96" name="Picture 6" descr="http://static1.squarespace.com/static/54e9737fe4b07c3f655e6242/54eb2a8de4b0904aceb70ecd/55a25168e4b02ee06b2a48d6/1436701032324/withaudio.png?format=750w"/>
+          <p:cNvPicPr>
+            <a:picLocks noChangeAspect="1" noChangeArrowheads="1"/>
+          </p:cNvPicPr>
+          <p:nvPr/>
+        </p:nvPicPr>
+        <p:blipFill>
+          <a:blip r:embed="rId2" cstate="print">
+            <a:extLst>
+              <a:ext uri="{28A0092B-C50C-407E-A947-70E740481C1C}">
+                <a14:useLocalDpi xmlns:a14="http://schemas.microsoft.com/office/drawing/2010/main" val="0"/>
+              </a:ext>
+            </a:extLst>
+          </a:blip>
+          <a:srcRect/>
+          <a:stretch>
+            <a:fillRect/>
+          </a:stretch>
+        </p:blipFill>
+        <p:spPr bwMode="auto">
+          <a:xfrm flipH="1">
+            <a:off x="470704" y="4029045"/>
+            <a:ext cx="536763" cy="560038"/>
+          </a:xfrm>
+          <a:prstGeom prst="rect">
+            <a:avLst/>
+          </a:prstGeom>
+          <a:noFill/>
+          <a:extLst>
+            <a:ext uri="{909E8E84-426E-40DD-AFC4-6F175D3DCCD1}">
+              <a14:hiddenFill xmlns:a14="http://schemas.microsoft.com/office/drawing/2010/main">
+                <a:solidFill>
+                  <a:srgbClr val="FFFFFF"/>
+                </a:solidFill>
+              </a14:hiddenFill>
+            </a:ext>
+          </a:extLst>
+        </p:spPr>
+      </p:pic>
+      <p:sp>
+        <p:nvSpPr>
+          <p:cNvPr id="97" name="Rectangle 96"/>
+          <p:cNvSpPr/>
+          <p:nvPr/>
+        </p:nvSpPr>
+        <p:spPr>
+          <a:xfrm>
+            <a:off x="4075070" y="2642326"/>
+            <a:ext cx="1197924" cy="243034"/>
+          </a:xfrm>
+          <a:prstGeom prst="rect">
+            <a:avLst/>
+          </a:prstGeom>
+        </p:spPr>
+        <p:style>
+          <a:lnRef idx="2">
+            <a:schemeClr val="accent6"/>
+          </a:lnRef>
+          <a:fillRef idx="1">
+            <a:schemeClr val="lt1"/>
+          </a:fillRef>
+          <a:effectRef idx="0">
+            <a:schemeClr val="accent6"/>
+          </a:effectRef>
+          <a:fontRef idx="minor">
+            <a:schemeClr val="dk1"/>
+          </a:fontRef>
+        </p:style>
+        <p:txBody>
+          <a:bodyPr rtlCol="0" anchor="ctr"/>
+          <a:lstStyle/>
+          <a:p>
+            <a:pPr algn="ctr"/>
+            <a:r>
+              <a:rPr lang="en-GB" sz="1200" dirty="0" smtClean="0"/>
+              <a:t>Car Position</a:t>
+            </a:r>
+            <a:endParaRPr lang="en-GB" sz="1200" dirty="0"/>
+          </a:p>
+        </p:txBody>
+      </p:sp>
+      <p:sp>
+        <p:nvSpPr>
+          <p:cNvPr id="98" name="Rectangle 97"/>
+          <p:cNvSpPr/>
+          <p:nvPr/>
+        </p:nvSpPr>
+        <p:spPr>
+          <a:xfrm>
+            <a:off x="4062822" y="2928235"/>
+            <a:ext cx="1210172" cy="243034"/>
+          </a:xfrm>
+          <a:prstGeom prst="rect">
+            <a:avLst/>
+          </a:prstGeom>
+        </p:spPr>
+        <p:style>
+          <a:lnRef idx="2">
+            <a:schemeClr val="accent6"/>
+          </a:lnRef>
+          <a:fillRef idx="1">
+            <a:schemeClr val="lt1"/>
+          </a:fillRef>
+          <a:effectRef idx="0">
+            <a:schemeClr val="accent6"/>
+          </a:effectRef>
+          <a:fontRef idx="minor">
+            <a:schemeClr val="dk1"/>
+          </a:fontRef>
+        </p:style>
+        <p:txBody>
+          <a:bodyPr rtlCol="0" anchor="ctr"/>
+          <a:lstStyle/>
+          <a:p>
+            <a:pPr algn="ctr"/>
+            <a:r>
+              <a:rPr lang="en-GB" sz="1200" dirty="0" smtClean="0"/>
+              <a:t>Car Handling</a:t>
+            </a:r>
+            <a:endParaRPr lang="en-GB" sz="1200" dirty="0"/>
+          </a:p>
+        </p:txBody>
+      </p:sp>
+      <p:sp>
+        <p:nvSpPr>
+          <p:cNvPr id="99" name="Rectangle 98"/>
+          <p:cNvSpPr/>
+          <p:nvPr/>
+        </p:nvSpPr>
+        <p:spPr>
+          <a:xfrm>
+            <a:off x="4062822" y="3240798"/>
+            <a:ext cx="1210172" cy="243034"/>
+          </a:xfrm>
+          <a:prstGeom prst="rect">
+            <a:avLst/>
+          </a:prstGeom>
+        </p:spPr>
+        <p:style>
+          <a:lnRef idx="2">
+            <a:schemeClr val="accent6"/>
+          </a:lnRef>
+          <a:fillRef idx="1">
+            <a:schemeClr val="lt1"/>
+          </a:fillRef>
+          <a:effectRef idx="0">
+            <a:schemeClr val="accent6"/>
+          </a:effectRef>
+          <a:fontRef idx="minor">
+            <a:schemeClr val="dk1"/>
+          </a:fontRef>
+        </p:style>
+        <p:txBody>
+          <a:bodyPr rtlCol="0" anchor="ctr"/>
+          <a:lstStyle/>
+          <a:p>
+            <a:pPr algn="ctr"/>
+            <a:r>
+              <a:rPr lang="en-GB" sz="1200" dirty="0" smtClean="0"/>
+              <a:t>Gear Shifting</a:t>
+            </a:r>
+            <a:endParaRPr lang="en-GB" sz="1200" dirty="0"/>
+          </a:p>
+        </p:txBody>
+      </p:sp>
+      <p:sp>
+        <p:nvSpPr>
+          <p:cNvPr id="100" name="Rectangle 99"/>
+          <p:cNvSpPr/>
+          <p:nvPr/>
+        </p:nvSpPr>
+        <p:spPr>
+          <a:xfrm>
+            <a:off x="4068007" y="2344325"/>
+            <a:ext cx="1204987" cy="243034"/>
+          </a:xfrm>
+          <a:prstGeom prst="rect">
+            <a:avLst/>
+          </a:prstGeom>
+        </p:spPr>
+        <p:style>
+          <a:lnRef idx="2">
+            <a:schemeClr val="accent6"/>
+          </a:lnRef>
+          <a:fillRef idx="1">
+            <a:schemeClr val="lt1"/>
+          </a:fillRef>
+          <a:effectRef idx="0">
+            <a:schemeClr val="accent6"/>
+          </a:effectRef>
+          <a:fontRef idx="minor">
+            <a:schemeClr val="dk1"/>
+          </a:fontRef>
+        </p:style>
+        <p:txBody>
+          <a:bodyPr rtlCol="0" anchor="ctr"/>
+          <a:lstStyle/>
+          <a:p>
+            <a:pPr algn="ctr"/>
+            <a:r>
+              <a:rPr lang="en-GB" sz="1200" dirty="0" smtClean="0"/>
+              <a:t>Logger</a:t>
+            </a:r>
+            <a:endParaRPr lang="en-GB" sz="1200" dirty="0"/>
+          </a:p>
+        </p:txBody>
+      </p:sp>
+      <p:sp>
+        <p:nvSpPr>
+          <p:cNvPr id="101" name="Right Arrow 100"/>
+          <p:cNvSpPr/>
+          <p:nvPr/>
+        </p:nvSpPr>
+        <p:spPr>
+          <a:xfrm>
+            <a:off x="1546644" y="758028"/>
+            <a:ext cx="482696" cy="190888"/>
+          </a:xfrm>
+          <a:prstGeom prst="rightArrow">
+            <a:avLst>
+              <a:gd name="adj1" fmla="val 27725"/>
+              <a:gd name="adj2" fmla="val 71123"/>
+            </a:avLst>
+          </a:prstGeom>
+        </p:spPr>
+        <p:style>
+          <a:lnRef idx="2">
+            <a:schemeClr val="accent1">
+              <a:shade val="50000"/>
+            </a:schemeClr>
+          </a:lnRef>
+          <a:fillRef idx="1">
+            <a:schemeClr val="accent1"/>
+          </a:fillRef>
+          <a:effectRef idx="0">
+            <a:schemeClr val="accent1"/>
+          </a:effectRef>
+          <a:fontRef idx="minor">
+            <a:schemeClr val="lt1"/>
+          </a:fontRef>
+        </p:style>
+        <p:txBody>
+          <a:bodyPr rtlCol="0" anchor="ctr"/>
+          <a:lstStyle/>
+          <a:p>
+            <a:pPr algn="ctr"/>
+            <a:endParaRPr lang="en-GB" dirty="0"/>
+          </a:p>
+        </p:txBody>
+      </p:sp>
+      <p:sp>
+        <p:nvSpPr>
+          <p:cNvPr id="102" name="Right Arrow 101"/>
+          <p:cNvSpPr/>
+          <p:nvPr/>
+        </p:nvSpPr>
+        <p:spPr>
+          <a:xfrm rot="5400000">
+            <a:off x="2308691" y="1641553"/>
+            <a:ext cx="583530" cy="190888"/>
+          </a:xfrm>
+          <a:prstGeom prst="rightArrow">
+            <a:avLst>
+              <a:gd name="adj1" fmla="val 27725"/>
+              <a:gd name="adj2" fmla="val 71123"/>
+            </a:avLst>
+          </a:prstGeom>
+        </p:spPr>
+        <p:style>
+          <a:lnRef idx="2">
+            <a:schemeClr val="accent1">
+              <a:shade val="50000"/>
+            </a:schemeClr>
+          </a:lnRef>
+          <a:fillRef idx="1">
+            <a:schemeClr val="accent1"/>
+          </a:fillRef>
+          <a:effectRef idx="0">
+            <a:schemeClr val="accent1"/>
+          </a:effectRef>
+          <a:fontRef idx="minor">
+            <a:schemeClr val="lt1"/>
+          </a:fontRef>
+        </p:style>
+        <p:txBody>
+          <a:bodyPr rtlCol="0" anchor="ctr"/>
+          <a:lstStyle/>
+          <a:p>
+            <a:pPr algn="ctr"/>
+            <a:endParaRPr lang="en-GB" dirty="0"/>
+          </a:p>
+        </p:txBody>
+      </p:sp>
+      <p:sp>
+        <p:nvSpPr>
+          <p:cNvPr id="103" name="TextBox 102"/>
+          <p:cNvSpPr txBox="1"/>
+          <p:nvPr/>
+        </p:nvSpPr>
+        <p:spPr>
+          <a:xfrm>
+            <a:off x="2029339" y="3617344"/>
+            <a:ext cx="739305" cy="369332"/>
+          </a:xfrm>
+          <a:prstGeom prst="rect">
+            <a:avLst/>
+          </a:prstGeom>
+          <a:noFill/>
+        </p:spPr>
+        <p:txBody>
+          <a:bodyPr wrap="none" rtlCol="0">
+            <a:spAutoFit/>
+          </a:bodyPr>
+          <a:lstStyle/>
+          <a:p>
+            <a:pPr algn="ctr"/>
+            <a:r>
+              <a:rPr lang="en-GB" sz="900" dirty="0" smtClean="0"/>
+              <a:t>Feedback </a:t>
+            </a:r>
+          </a:p>
+          <a:p>
+            <a:pPr algn="ctr"/>
+            <a:r>
+              <a:rPr lang="en-GB" sz="900" dirty="0" smtClean="0"/>
+              <a:t>Instructions</a:t>
+            </a:r>
+            <a:endParaRPr lang="en-GB" sz="900" dirty="0"/>
+          </a:p>
+        </p:txBody>
+      </p:sp>
+      <p:sp>
+        <p:nvSpPr>
+          <p:cNvPr id="104" name="Right Arrow 103"/>
+          <p:cNvSpPr/>
+          <p:nvPr/>
+        </p:nvSpPr>
+        <p:spPr>
+          <a:xfrm>
+            <a:off x="3197927" y="2760609"/>
+            <a:ext cx="755654" cy="190888"/>
+          </a:xfrm>
+          <a:prstGeom prst="rightArrow">
+            <a:avLst>
+              <a:gd name="adj1" fmla="val 27725"/>
+              <a:gd name="adj2" fmla="val 71123"/>
+            </a:avLst>
+          </a:prstGeom>
+        </p:spPr>
+        <p:style>
+          <a:lnRef idx="2">
+            <a:schemeClr val="accent1">
+              <a:shade val="50000"/>
+            </a:schemeClr>
+          </a:lnRef>
+          <a:fillRef idx="1">
+            <a:schemeClr val="accent1"/>
+          </a:fillRef>
+          <a:effectRef idx="0">
+            <a:schemeClr val="accent1"/>
+          </a:effectRef>
+          <a:fontRef idx="minor">
+            <a:schemeClr val="lt1"/>
+          </a:fontRef>
+        </p:style>
+        <p:txBody>
+          <a:bodyPr rtlCol="0" anchor="ctr"/>
+          <a:lstStyle/>
+          <a:p>
+            <a:pPr algn="ctr"/>
+            <a:endParaRPr lang="en-GB" dirty="0"/>
+          </a:p>
+        </p:txBody>
+      </p:sp>
+      <p:sp>
+        <p:nvSpPr>
+          <p:cNvPr id="105" name="Right Arrow 104"/>
+          <p:cNvSpPr/>
+          <p:nvPr/>
+        </p:nvSpPr>
+        <p:spPr>
+          <a:xfrm>
+            <a:off x="3197927" y="2966858"/>
+            <a:ext cx="755654" cy="190888"/>
+          </a:xfrm>
+          <a:prstGeom prst="rightArrow">
+            <a:avLst>
+              <a:gd name="adj1" fmla="val 27725"/>
+              <a:gd name="adj2" fmla="val 71123"/>
+            </a:avLst>
+          </a:prstGeom>
+        </p:spPr>
+        <p:style>
+          <a:lnRef idx="2">
+            <a:schemeClr val="accent1">
+              <a:shade val="50000"/>
+            </a:schemeClr>
+          </a:lnRef>
+          <a:fillRef idx="1">
+            <a:schemeClr val="accent1"/>
+          </a:fillRef>
+          <a:effectRef idx="0">
+            <a:schemeClr val="accent1"/>
+          </a:effectRef>
+          <a:fontRef idx="minor">
+            <a:schemeClr val="lt1"/>
+          </a:fontRef>
+        </p:style>
+        <p:txBody>
+          <a:bodyPr rtlCol="0" anchor="ctr"/>
+          <a:lstStyle/>
+          <a:p>
+            <a:pPr algn="ctr"/>
+            <a:endParaRPr lang="en-GB" dirty="0"/>
+          </a:p>
+        </p:txBody>
+      </p:sp>
+      <p:sp>
+        <p:nvSpPr>
+          <p:cNvPr id="106" name="Right Arrow 105"/>
+          <p:cNvSpPr/>
+          <p:nvPr/>
+        </p:nvSpPr>
+        <p:spPr>
+          <a:xfrm>
+            <a:off x="3197927" y="3191793"/>
+            <a:ext cx="755654" cy="190888"/>
+          </a:xfrm>
+          <a:prstGeom prst="rightArrow">
+            <a:avLst>
+              <a:gd name="adj1" fmla="val 27725"/>
+              <a:gd name="adj2" fmla="val 71123"/>
+            </a:avLst>
+          </a:prstGeom>
+        </p:spPr>
+        <p:style>
+          <a:lnRef idx="2">
+            <a:schemeClr val="accent1">
+              <a:shade val="50000"/>
+            </a:schemeClr>
+          </a:lnRef>
+          <a:fillRef idx="1">
+            <a:schemeClr val="accent1"/>
+          </a:fillRef>
+          <a:effectRef idx="0">
+            <a:schemeClr val="accent1"/>
+          </a:effectRef>
+          <a:fontRef idx="minor">
+            <a:schemeClr val="lt1"/>
+          </a:fontRef>
+        </p:style>
+        <p:txBody>
+          <a:bodyPr rtlCol="0" anchor="ctr"/>
+          <a:lstStyle/>
+          <a:p>
+            <a:pPr algn="ctr"/>
+            <a:endParaRPr lang="en-GB" dirty="0"/>
+          </a:p>
+        </p:txBody>
+      </p:sp>
+      <p:sp>
+        <p:nvSpPr>
+          <p:cNvPr id="107" name="Right Arrow 106"/>
+          <p:cNvSpPr/>
+          <p:nvPr/>
+        </p:nvSpPr>
+        <p:spPr>
+          <a:xfrm rot="10800000">
+            <a:off x="3506207" y="781672"/>
+            <a:ext cx="564955" cy="190888"/>
+          </a:xfrm>
+          <a:prstGeom prst="rightArrow">
+            <a:avLst>
+              <a:gd name="adj1" fmla="val 27725"/>
+              <a:gd name="adj2" fmla="val 71123"/>
+            </a:avLst>
+          </a:prstGeom>
+        </p:spPr>
+        <p:style>
+          <a:lnRef idx="2">
+            <a:schemeClr val="accent1">
+              <a:shade val="50000"/>
+            </a:schemeClr>
+          </a:lnRef>
+          <a:fillRef idx="1">
+            <a:schemeClr val="accent1"/>
+          </a:fillRef>
+          <a:effectRef idx="0">
+            <a:schemeClr val="accent1"/>
+          </a:effectRef>
+          <a:fontRef idx="minor">
+            <a:schemeClr val="lt1"/>
+          </a:fontRef>
+        </p:style>
+        <p:txBody>
+          <a:bodyPr rtlCol="0" anchor="ctr"/>
+          <a:lstStyle/>
+          <a:p>
+            <a:pPr algn="ctr"/>
+            <a:endParaRPr lang="en-GB" dirty="0"/>
+          </a:p>
+        </p:txBody>
+      </p:sp>
+      <p:sp>
+        <p:nvSpPr>
+          <p:cNvPr id="108" name="TextBox 107"/>
+          <p:cNvSpPr txBox="1"/>
+          <p:nvPr/>
+        </p:nvSpPr>
+        <p:spPr>
+          <a:xfrm>
+            <a:off x="3424123" y="555339"/>
+            <a:ext cx="750526" cy="230832"/>
+          </a:xfrm>
+          <a:prstGeom prst="rect">
+            <a:avLst/>
+          </a:prstGeom>
+          <a:noFill/>
+        </p:spPr>
+        <p:txBody>
+          <a:bodyPr wrap="none" rtlCol="0">
+            <a:spAutoFit/>
+          </a:bodyPr>
+          <a:lstStyle/>
+          <a:p>
+            <a:pPr algn="ctr"/>
+            <a:r>
+              <a:rPr lang="en-GB" sz="900" dirty="0" smtClean="0"/>
+              <a:t>Sections.csv</a:t>
+            </a:r>
+            <a:endParaRPr lang="en-GB" sz="900" dirty="0"/>
+          </a:p>
+        </p:txBody>
+      </p:sp>
+      <p:sp>
+        <p:nvSpPr>
+          <p:cNvPr id="109" name="TextBox 108"/>
+          <p:cNvSpPr txBox="1"/>
+          <p:nvPr/>
+        </p:nvSpPr>
+        <p:spPr>
+          <a:xfrm>
+            <a:off x="3404768" y="1309636"/>
+            <a:ext cx="755336" cy="230832"/>
+          </a:xfrm>
+          <a:prstGeom prst="rect">
+            <a:avLst/>
+          </a:prstGeom>
+          <a:noFill/>
+        </p:spPr>
+        <p:txBody>
+          <a:bodyPr wrap="none" rtlCol="0">
+            <a:spAutoFit/>
+          </a:bodyPr>
+          <a:lstStyle/>
+          <a:p>
+            <a:pPr algn="ctr"/>
+            <a:r>
+              <a:rPr lang="en-GB" sz="900" dirty="0"/>
+              <a:t>R</a:t>
+            </a:r>
+            <a:r>
+              <a:rPr lang="en-GB" sz="900" dirty="0" smtClean="0"/>
+              <a:t>aceline.csv</a:t>
+            </a:r>
+            <a:endParaRPr lang="en-GB" sz="900" dirty="0"/>
+          </a:p>
+        </p:txBody>
+      </p:sp>
+      <p:sp>
+        <p:nvSpPr>
+          <p:cNvPr id="110" name="Right Arrow 109"/>
+          <p:cNvSpPr/>
+          <p:nvPr/>
+        </p:nvSpPr>
+        <p:spPr>
+          <a:xfrm rot="10800000">
+            <a:off x="3527611" y="1083146"/>
+            <a:ext cx="564955" cy="190888"/>
+          </a:xfrm>
+          <a:prstGeom prst="rightArrow">
+            <a:avLst>
+              <a:gd name="adj1" fmla="val 27725"/>
+              <a:gd name="adj2" fmla="val 71123"/>
+            </a:avLst>
+          </a:prstGeom>
+        </p:spPr>
+        <p:style>
+          <a:lnRef idx="2">
+            <a:schemeClr val="accent1">
+              <a:shade val="50000"/>
+            </a:schemeClr>
+          </a:lnRef>
+          <a:fillRef idx="1">
+            <a:schemeClr val="accent1"/>
+          </a:fillRef>
+          <a:effectRef idx="0">
+            <a:schemeClr val="accent1"/>
+          </a:effectRef>
+          <a:fontRef idx="minor">
+            <a:schemeClr val="lt1"/>
+          </a:fontRef>
+        </p:style>
+        <p:txBody>
+          <a:bodyPr rtlCol="0" anchor="ctr"/>
+          <a:lstStyle/>
+          <a:p>
+            <a:pPr algn="ctr"/>
+            <a:endParaRPr lang="en-GB" dirty="0"/>
+          </a:p>
+        </p:txBody>
+      </p:sp>
+      <p:sp>
+        <p:nvSpPr>
+          <p:cNvPr id="111" name="Right Arrow 110"/>
+          <p:cNvSpPr/>
+          <p:nvPr/>
+        </p:nvSpPr>
+        <p:spPr>
+          <a:xfrm rot="5400000">
+            <a:off x="2673070" y="3692740"/>
+            <a:ext cx="408571" cy="190888"/>
+          </a:xfrm>
+          <a:prstGeom prst="rightArrow">
+            <a:avLst>
+              <a:gd name="adj1" fmla="val 27725"/>
+              <a:gd name="adj2" fmla="val 71123"/>
+            </a:avLst>
+          </a:prstGeom>
+        </p:spPr>
+        <p:style>
+          <a:lnRef idx="2">
+            <a:schemeClr val="accent1">
+              <a:shade val="50000"/>
+            </a:schemeClr>
+          </a:lnRef>
+          <a:fillRef idx="1">
+            <a:schemeClr val="accent1"/>
+          </a:fillRef>
+          <a:effectRef idx="0">
+            <a:schemeClr val="accent1"/>
+          </a:effectRef>
+          <a:fontRef idx="minor">
+            <a:schemeClr val="lt1"/>
+          </a:fontRef>
+        </p:style>
+        <p:txBody>
+          <a:bodyPr rtlCol="0" anchor="ctr"/>
+          <a:lstStyle/>
+          <a:p>
+            <a:pPr algn="ctr"/>
+            <a:endParaRPr lang="en-GB" dirty="0"/>
+          </a:p>
+        </p:txBody>
+      </p:sp>
+      <p:sp>
+        <p:nvSpPr>
+          <p:cNvPr id="112" name="TextBox 111"/>
+          <p:cNvSpPr txBox="1"/>
+          <p:nvPr/>
+        </p:nvSpPr>
+        <p:spPr>
+          <a:xfrm>
+            <a:off x="2665298" y="1537954"/>
+            <a:ext cx="1210588" cy="507831"/>
+          </a:xfrm>
+          <a:prstGeom prst="rect">
+            <a:avLst/>
+          </a:prstGeom>
+          <a:noFill/>
+        </p:spPr>
+        <p:txBody>
+          <a:bodyPr wrap="none" rtlCol="0">
+            <a:spAutoFit/>
+          </a:bodyPr>
+          <a:lstStyle/>
+          <a:p>
+            <a:pPr algn="ctr"/>
+            <a:r>
+              <a:rPr lang="en-GB" sz="900" dirty="0" smtClean="0"/>
+              <a:t>Telemetry </a:t>
+            </a:r>
+          </a:p>
+          <a:p>
+            <a:pPr algn="ctr"/>
+            <a:r>
+              <a:rPr lang="en-GB" sz="900" dirty="0" smtClean="0"/>
+              <a:t>+ </a:t>
+            </a:r>
+          </a:p>
+          <a:p>
+            <a:pPr algn="ctr"/>
+            <a:r>
+              <a:rPr lang="en-GB" sz="900" dirty="0" smtClean="0"/>
+              <a:t>Supporting Structures</a:t>
+            </a:r>
+            <a:endParaRPr lang="en-GB" sz="900" dirty="0"/>
+          </a:p>
+        </p:txBody>
+      </p:sp>
+      <p:sp>
+        <p:nvSpPr>
+          <p:cNvPr id="113" name="Flowchart: Multidocument 112"/>
+          <p:cNvSpPr/>
+          <p:nvPr/>
+        </p:nvSpPr>
+        <p:spPr>
+          <a:xfrm>
+            <a:off x="3936985" y="3996793"/>
+            <a:ext cx="1006804" cy="735112"/>
+          </a:xfrm>
+          <a:prstGeom prst="flowChartMultidocument">
+            <a:avLst/>
+          </a:prstGeom>
+        </p:spPr>
+        <p:style>
+          <a:lnRef idx="2">
+            <a:schemeClr val="accent6"/>
+          </a:lnRef>
+          <a:fillRef idx="1">
+            <a:schemeClr val="lt1"/>
+          </a:fillRef>
+          <a:effectRef idx="0">
+            <a:schemeClr val="accent6"/>
+          </a:effectRef>
+          <a:fontRef idx="minor">
+            <a:schemeClr val="dk1"/>
+          </a:fontRef>
+        </p:style>
+        <p:txBody>
+          <a:bodyPr rtlCol="0" anchor="ctr"/>
+          <a:lstStyle/>
+          <a:p>
+            <a:pPr algn="ctr"/>
+            <a:r>
+              <a:rPr lang="en-GB" sz="1200" dirty="0" smtClean="0"/>
+              <a:t>Feedback Audio Files</a:t>
+            </a:r>
+            <a:endParaRPr lang="en-GB" sz="1200" dirty="0"/>
+          </a:p>
+        </p:txBody>
+      </p:sp>
+      <p:sp>
+        <p:nvSpPr>
+          <p:cNvPr id="114" name="Right Arrow 113"/>
+          <p:cNvSpPr/>
+          <p:nvPr/>
+        </p:nvSpPr>
+        <p:spPr>
+          <a:xfrm rot="10800000">
+            <a:off x="3356119" y="4268905"/>
+            <a:ext cx="408571" cy="190888"/>
+          </a:xfrm>
+          <a:prstGeom prst="rightArrow">
+            <a:avLst>
+              <a:gd name="adj1" fmla="val 27725"/>
+              <a:gd name="adj2" fmla="val 71123"/>
+            </a:avLst>
+          </a:prstGeom>
+        </p:spPr>
+        <p:style>
+          <a:lnRef idx="2">
+            <a:schemeClr val="accent1">
+              <a:shade val="50000"/>
+            </a:schemeClr>
+          </a:lnRef>
+          <a:fillRef idx="1">
+            <a:schemeClr val="accent1"/>
+          </a:fillRef>
+          <a:effectRef idx="0">
+            <a:schemeClr val="accent1"/>
+          </a:effectRef>
+          <a:fontRef idx="minor">
+            <a:schemeClr val="lt1"/>
+          </a:fontRef>
+        </p:style>
+        <p:txBody>
+          <a:bodyPr rtlCol="0" anchor="ctr"/>
+          <a:lstStyle/>
+          <a:p>
+            <a:pPr algn="ctr"/>
+            <a:endParaRPr lang="en-GB" dirty="0"/>
+          </a:p>
+        </p:txBody>
+      </p:sp>
+      <p:sp>
+        <p:nvSpPr>
+          <p:cNvPr id="115" name="Right Arrow 114"/>
+          <p:cNvSpPr/>
+          <p:nvPr/>
+        </p:nvSpPr>
+        <p:spPr>
+          <a:xfrm rot="10800000">
+            <a:off x="1133153" y="4236611"/>
+            <a:ext cx="692295" cy="190888"/>
+          </a:xfrm>
+          <a:prstGeom prst="rightArrow">
+            <a:avLst>
+              <a:gd name="adj1" fmla="val 27725"/>
+              <a:gd name="adj2" fmla="val 71123"/>
+            </a:avLst>
+          </a:prstGeom>
+        </p:spPr>
+        <p:style>
+          <a:lnRef idx="2">
+            <a:schemeClr val="accent1">
+              <a:shade val="50000"/>
+            </a:schemeClr>
+          </a:lnRef>
+          <a:fillRef idx="1">
+            <a:schemeClr val="accent1"/>
+          </a:fillRef>
+          <a:effectRef idx="0">
+            <a:schemeClr val="accent1"/>
+          </a:effectRef>
+          <a:fontRef idx="minor">
+            <a:schemeClr val="lt1"/>
+          </a:fontRef>
+        </p:style>
+        <p:txBody>
+          <a:bodyPr rtlCol="0" anchor="ctr"/>
+          <a:lstStyle/>
+          <a:p>
+            <a:pPr algn="ctr"/>
+            <a:endParaRPr lang="en-GB" dirty="0"/>
+          </a:p>
+        </p:txBody>
+      </p:sp>
+      <p:sp>
+        <p:nvSpPr>
+          <p:cNvPr id="116" name="TextBox 115"/>
+          <p:cNvSpPr txBox="1"/>
+          <p:nvPr/>
+        </p:nvSpPr>
+        <p:spPr>
+          <a:xfrm>
+            <a:off x="810093" y="4461560"/>
+            <a:ext cx="958917" cy="369332"/>
+          </a:xfrm>
+          <a:prstGeom prst="rect">
+            <a:avLst/>
+          </a:prstGeom>
+          <a:noFill/>
+        </p:spPr>
+        <p:txBody>
+          <a:bodyPr wrap="none" rtlCol="0">
+            <a:spAutoFit/>
+          </a:bodyPr>
+          <a:lstStyle/>
+          <a:p>
+            <a:pPr algn="ctr"/>
+            <a:r>
+              <a:rPr lang="en-GB" sz="900" dirty="0" smtClean="0"/>
+              <a:t>Audio Feedback </a:t>
+            </a:r>
+          </a:p>
+          <a:p>
+            <a:pPr algn="ctr"/>
+            <a:r>
+              <a:rPr lang="en-GB" sz="900" dirty="0" smtClean="0"/>
+              <a:t>Instructions</a:t>
+            </a:r>
+            <a:endParaRPr lang="en-GB" sz="900" dirty="0"/>
+          </a:p>
+        </p:txBody>
+      </p:sp>
+      <p:sp>
+        <p:nvSpPr>
+          <p:cNvPr id="117" name="Right Arrow 116"/>
+          <p:cNvSpPr/>
+          <p:nvPr/>
+        </p:nvSpPr>
+        <p:spPr>
+          <a:xfrm>
+            <a:off x="3204692" y="2539174"/>
+            <a:ext cx="755654" cy="190888"/>
+          </a:xfrm>
+          <a:prstGeom prst="rightArrow">
+            <a:avLst>
+              <a:gd name="adj1" fmla="val 27725"/>
+              <a:gd name="adj2" fmla="val 71123"/>
+            </a:avLst>
+          </a:prstGeom>
+        </p:spPr>
+        <p:style>
+          <a:lnRef idx="2">
+            <a:schemeClr val="accent1">
+              <a:shade val="50000"/>
+            </a:schemeClr>
+          </a:lnRef>
+          <a:fillRef idx="1">
+            <a:schemeClr val="accent1"/>
+          </a:fillRef>
+          <a:effectRef idx="0">
+            <a:schemeClr val="accent1"/>
+          </a:effectRef>
+          <a:fontRef idx="minor">
+            <a:schemeClr val="lt1"/>
+          </a:fontRef>
+        </p:style>
+        <p:txBody>
+          <a:bodyPr rtlCol="0" anchor="ctr"/>
+          <a:lstStyle/>
+          <a:p>
+            <a:pPr algn="ctr"/>
+            <a:endParaRPr lang="en-GB" dirty="0"/>
+          </a:p>
+        </p:txBody>
+      </p:sp>
+    </p:spTree>
+    <p:extLst>
+      <p:ext uri="{BB962C8B-B14F-4D97-AF65-F5344CB8AC3E}">
+        <p14:creationId xmlns:p14="http://schemas.microsoft.com/office/powerpoint/2010/main" val="3763665465"/>
+      </p:ext>
+    </p:extLst>
+  </p:cSld>
+  <p:clrMapOvr>
+    <a:masterClrMapping/>
+  </p:clrMapOvr>
+</p:sld>
+</file>
+
+<file path=ppt/slides/slide7.xml><?xml version="1.0" encoding="utf-8"?>
+<p:sld xmlns:a="http://schemas.openxmlformats.org/drawingml/2006/main" xmlns:r="http://schemas.openxmlformats.org/officeDocument/2006/relationships" xmlns:p="http://schemas.openxmlformats.org/presentationml/2006/main">
+  <p:cSld>
+    <p:spTree>
+      <p:nvGrpSpPr>
+        <p:cNvPr id="1" name=""/>
+        <p:cNvGrpSpPr/>
+        <p:nvPr/>
+      </p:nvGrpSpPr>
+      <p:grpSpPr>
+        <a:xfrm>
+          <a:off x="0" y="0"/>
+          <a:ext cx="0" cy="0"/>
+          <a:chOff x="0" y="0"/>
+          <a:chExt cx="0" cy="0"/>
+        </a:xfrm>
+      </p:grpSpPr>
+      <p:pic>
+        <p:nvPicPr>
+          <p:cNvPr id="4" name="Picture 3"/>
+          <p:cNvPicPr>
+            <a:picLocks noChangeAspect="1"/>
+          </p:cNvPicPr>
+          <p:nvPr/>
+        </p:nvPicPr>
+        <p:blipFill>
+          <a:blip r:embed="rId2" cstate="print">
+            <a:extLst>
+              <a:ext uri="{28A0092B-C50C-407E-A947-70E740481C1C}">
+                <a14:useLocalDpi xmlns:a14="http://schemas.microsoft.com/office/drawing/2010/main" val="0"/>
+              </a:ext>
+            </a:extLst>
+          </a:blip>
+          <a:stretch>
+            <a:fillRect/>
+          </a:stretch>
+        </p:blipFill>
+        <p:spPr>
+          <a:xfrm>
+            <a:off x="4387362" y="5362959"/>
+            <a:ext cx="7784122" cy="5838092"/>
+          </a:xfrm>
+          <a:prstGeom prst="rect">
+            <a:avLst/>
+          </a:prstGeom>
+        </p:spPr>
+      </p:pic>
+      <p:sp>
+        <p:nvSpPr>
+          <p:cNvPr id="5" name="Up Arrow 4"/>
+          <p:cNvSpPr/>
+          <p:nvPr/>
+        </p:nvSpPr>
+        <p:spPr>
+          <a:xfrm>
+            <a:off x="7620000" y="9436100"/>
+            <a:ext cx="484632" cy="952500"/>
+          </a:xfrm>
+          <a:prstGeom prst="upArrow">
+            <a:avLst>
+              <a:gd name="adj1" fmla="val 34277"/>
+              <a:gd name="adj2" fmla="val 44759"/>
+            </a:avLst>
+          </a:prstGeom>
+        </p:spPr>
+        <p:style>
+          <a:lnRef idx="2">
+            <a:schemeClr val="accent1">
+              <a:shade val="50000"/>
+            </a:schemeClr>
+          </a:lnRef>
+          <a:fillRef idx="1">
+            <a:schemeClr val="accent1"/>
+          </a:fillRef>
+          <a:effectRef idx="0">
+            <a:schemeClr val="accent1"/>
+          </a:effectRef>
+          <a:fontRef idx="minor">
+            <a:schemeClr val="lt1"/>
+          </a:fontRef>
+        </p:style>
+        <p:txBody>
+          <a:bodyPr rtlCol="0" anchor="ctr"/>
+          <a:lstStyle/>
+          <a:p>
+            <a:pPr algn="ctr"/>
+            <a:endParaRPr lang="en-GB"/>
+          </a:p>
+        </p:txBody>
+      </p:sp>
+      <p:sp>
+        <p:nvSpPr>
+          <p:cNvPr id="6" name="Up Arrow 5"/>
+          <p:cNvSpPr/>
+          <p:nvPr/>
+        </p:nvSpPr>
+        <p:spPr>
+          <a:xfrm>
+            <a:off x="8204200" y="9436100"/>
+            <a:ext cx="484632" cy="952500"/>
+          </a:xfrm>
+          <a:prstGeom prst="upArrow">
+            <a:avLst>
+              <a:gd name="adj1" fmla="val 34277"/>
+              <a:gd name="adj2" fmla="val 44759"/>
+            </a:avLst>
+          </a:prstGeom>
+        </p:spPr>
+        <p:style>
+          <a:lnRef idx="2">
+            <a:schemeClr val="accent1">
+              <a:shade val="50000"/>
+            </a:schemeClr>
+          </a:lnRef>
+          <a:fillRef idx="1">
+            <a:schemeClr val="accent1"/>
+          </a:fillRef>
+          <a:effectRef idx="0">
+            <a:schemeClr val="accent1"/>
+          </a:effectRef>
+          <a:fontRef idx="minor">
+            <a:schemeClr val="lt1"/>
+          </a:fontRef>
+        </p:style>
+        <p:txBody>
+          <a:bodyPr rtlCol="0" anchor="ctr"/>
+          <a:lstStyle/>
+          <a:p>
+            <a:pPr algn="ctr"/>
+            <a:endParaRPr lang="en-GB"/>
+          </a:p>
+        </p:txBody>
+      </p:sp>
+      <p:sp>
+        <p:nvSpPr>
+          <p:cNvPr id="7" name="Up Arrow 6"/>
+          <p:cNvSpPr/>
+          <p:nvPr/>
+        </p:nvSpPr>
+        <p:spPr>
+          <a:xfrm rot="20505049">
+            <a:off x="8915400" y="9626600"/>
+            <a:ext cx="484632" cy="952500"/>
+          </a:xfrm>
+          <a:prstGeom prst="upArrow">
+            <a:avLst>
+              <a:gd name="adj1" fmla="val 34277"/>
+              <a:gd name="adj2" fmla="val 44759"/>
+            </a:avLst>
+          </a:prstGeom>
+        </p:spPr>
+        <p:style>
+          <a:lnRef idx="2">
+            <a:schemeClr val="accent1">
+              <a:shade val="50000"/>
+            </a:schemeClr>
+          </a:lnRef>
+          <a:fillRef idx="1">
+            <a:schemeClr val="accent1"/>
+          </a:fillRef>
+          <a:effectRef idx="0">
+            <a:schemeClr val="accent1"/>
+          </a:effectRef>
+          <a:fontRef idx="minor">
+            <a:schemeClr val="lt1"/>
+          </a:fontRef>
+        </p:style>
+        <p:txBody>
+          <a:bodyPr rtlCol="0" anchor="ctr"/>
+          <a:lstStyle/>
+          <a:p>
+            <a:pPr algn="ctr"/>
+            <a:endParaRPr lang="en-GB"/>
+          </a:p>
+        </p:txBody>
+      </p:sp>
+      <p:sp>
+        <p:nvSpPr>
+          <p:cNvPr id="8" name="Up Arrow 7"/>
+          <p:cNvSpPr/>
+          <p:nvPr/>
+        </p:nvSpPr>
+        <p:spPr>
+          <a:xfrm rot="8488580">
+            <a:off x="5283200" y="7874000"/>
+            <a:ext cx="484632" cy="952500"/>
+          </a:xfrm>
+          <a:prstGeom prst="upArrow">
+            <a:avLst>
+              <a:gd name="adj1" fmla="val 34277"/>
+              <a:gd name="adj2" fmla="val 44759"/>
+            </a:avLst>
+          </a:prstGeom>
+        </p:spPr>
+        <p:style>
+          <a:lnRef idx="2">
+            <a:schemeClr val="accent1">
+              <a:shade val="50000"/>
+            </a:schemeClr>
+          </a:lnRef>
+          <a:fillRef idx="1">
+            <a:schemeClr val="accent1"/>
+          </a:fillRef>
+          <a:effectRef idx="0">
+            <a:schemeClr val="accent1"/>
+          </a:effectRef>
+          <a:fontRef idx="minor">
+            <a:schemeClr val="lt1"/>
+          </a:fontRef>
+        </p:style>
+        <p:txBody>
+          <a:bodyPr rtlCol="0" anchor="ctr"/>
+          <a:lstStyle/>
+          <a:p>
+            <a:pPr algn="ctr"/>
+            <a:endParaRPr lang="en-GB"/>
+          </a:p>
+        </p:txBody>
+      </p:sp>
+      <p:sp>
+        <p:nvSpPr>
+          <p:cNvPr id="9" name="Up Arrow 8"/>
+          <p:cNvSpPr/>
+          <p:nvPr/>
+        </p:nvSpPr>
+        <p:spPr>
+          <a:xfrm rot="5838559">
+            <a:off x="6706601" y="6089039"/>
+            <a:ext cx="484632" cy="1257779"/>
+          </a:xfrm>
+          <a:prstGeom prst="upArrow">
+            <a:avLst>
+              <a:gd name="adj1" fmla="val 34277"/>
+              <a:gd name="adj2" fmla="val 44759"/>
+            </a:avLst>
+          </a:prstGeom>
+        </p:spPr>
+        <p:style>
+          <a:lnRef idx="2">
+            <a:schemeClr val="accent1">
+              <a:shade val="50000"/>
+            </a:schemeClr>
+          </a:lnRef>
+          <a:fillRef idx="1">
+            <a:schemeClr val="accent1"/>
+          </a:fillRef>
+          <a:effectRef idx="0">
+            <a:schemeClr val="accent1"/>
+          </a:effectRef>
+          <a:fontRef idx="minor">
+            <a:schemeClr val="lt1"/>
+          </a:fontRef>
+        </p:style>
+        <p:txBody>
+          <a:bodyPr rtlCol="0" anchor="ctr"/>
+          <a:lstStyle/>
+          <a:p>
+            <a:pPr algn="ctr"/>
+            <a:endParaRPr lang="en-GB"/>
+          </a:p>
+        </p:txBody>
+      </p:sp>
+      <p:sp>
+        <p:nvSpPr>
+          <p:cNvPr id="10" name="TextBox 9"/>
+          <p:cNvSpPr txBox="1"/>
+          <p:nvPr/>
+        </p:nvSpPr>
+        <p:spPr>
+          <a:xfrm>
+            <a:off x="5003800" y="6057900"/>
+            <a:ext cx="1814984" cy="400110"/>
+          </a:xfrm>
+          <a:prstGeom prst="rect">
+            <a:avLst/>
+          </a:prstGeom>
+          <a:solidFill>
+            <a:schemeClr val="dk1">
+              <a:alpha val="50000"/>
+            </a:schemeClr>
+          </a:solidFill>
+          <a:ln>
+            <a:noFill/>
+          </a:ln>
+        </p:spPr>
+        <p:style>
+          <a:lnRef idx="0">
+            <a:scrgbClr r="0" g="0" b="0"/>
+          </a:lnRef>
+          <a:fillRef idx="0">
+            <a:scrgbClr r="0" g="0" b="0"/>
+          </a:fillRef>
+          <a:effectRef idx="0">
+            <a:scrgbClr r="0" g="0" b="0"/>
+          </a:effectRef>
+          <a:fontRef idx="minor">
+            <a:schemeClr val="lt1"/>
+          </a:fontRef>
+        </p:style>
+        <p:txBody>
+          <a:bodyPr wrap="none" rtlCol="0">
+            <a:spAutoFit/>
+          </a:bodyPr>
+          <a:lstStyle/>
+          <a:p>
+            <a:r>
+              <a:rPr lang="en-GB" sz="2000" b="1" dirty="0" smtClean="0"/>
+              <a:t>Steering Wheel</a:t>
+            </a:r>
+            <a:endParaRPr lang="en-GB" sz="2000" b="1" dirty="0"/>
+          </a:p>
+        </p:txBody>
+      </p:sp>
+      <p:sp>
+        <p:nvSpPr>
+          <p:cNvPr id="11" name="TextBox 10"/>
+          <p:cNvSpPr txBox="1"/>
+          <p:nvPr/>
+        </p:nvSpPr>
+        <p:spPr>
+          <a:xfrm>
+            <a:off x="4533900" y="7467600"/>
+            <a:ext cx="1114472" cy="400110"/>
+          </a:xfrm>
+          <a:prstGeom prst="rect">
+            <a:avLst/>
+          </a:prstGeom>
+          <a:solidFill>
+            <a:schemeClr val="dk1">
+              <a:alpha val="50000"/>
+            </a:schemeClr>
+          </a:solidFill>
+          <a:ln>
+            <a:noFill/>
+          </a:ln>
+        </p:spPr>
+        <p:style>
+          <a:lnRef idx="0">
+            <a:scrgbClr r="0" g="0" b="0"/>
+          </a:lnRef>
+          <a:fillRef idx="0">
+            <a:scrgbClr r="0" g="0" b="0"/>
+          </a:fillRef>
+          <a:effectRef idx="0">
+            <a:scrgbClr r="0" g="0" b="0"/>
+          </a:effectRef>
+          <a:fontRef idx="minor">
+            <a:schemeClr val="lt1"/>
+          </a:fontRef>
+        </p:style>
+        <p:txBody>
+          <a:bodyPr wrap="none" rtlCol="0">
+            <a:spAutoFit/>
+          </a:bodyPr>
+          <a:lstStyle/>
+          <a:p>
+            <a:r>
+              <a:rPr lang="en-GB" sz="2000" b="1" dirty="0" smtClean="0"/>
+              <a:t>H Shifter</a:t>
+            </a:r>
+            <a:endParaRPr lang="en-GB" sz="2000" b="1" dirty="0"/>
+          </a:p>
+        </p:txBody>
+      </p:sp>
+      <p:sp>
+        <p:nvSpPr>
+          <p:cNvPr id="12" name="TextBox 11"/>
+          <p:cNvSpPr txBox="1"/>
+          <p:nvPr/>
+        </p:nvSpPr>
+        <p:spPr>
+          <a:xfrm>
+            <a:off x="7137400" y="10477500"/>
+            <a:ext cx="851323" cy="400110"/>
+          </a:xfrm>
+          <a:prstGeom prst="rect">
+            <a:avLst/>
+          </a:prstGeom>
+          <a:solidFill>
+            <a:schemeClr val="dk1">
+              <a:alpha val="50000"/>
+            </a:schemeClr>
+          </a:solidFill>
+          <a:ln>
+            <a:noFill/>
+          </a:ln>
+        </p:spPr>
+        <p:style>
+          <a:lnRef idx="0">
+            <a:scrgbClr r="0" g="0" b="0"/>
+          </a:lnRef>
+          <a:fillRef idx="0">
+            <a:scrgbClr r="0" g="0" b="0"/>
+          </a:fillRef>
+          <a:effectRef idx="0">
+            <a:scrgbClr r="0" g="0" b="0"/>
+          </a:effectRef>
+          <a:fontRef idx="minor">
+            <a:schemeClr val="lt1"/>
+          </a:fontRef>
+        </p:style>
+        <p:txBody>
+          <a:bodyPr wrap="none" rtlCol="0">
+            <a:spAutoFit/>
+          </a:bodyPr>
+          <a:lstStyle/>
+          <a:p>
+            <a:r>
+              <a:rPr lang="en-GB" sz="2000" b="1" dirty="0" smtClean="0"/>
+              <a:t>Clutch</a:t>
+            </a:r>
+            <a:endParaRPr lang="en-GB" sz="2000" b="1" dirty="0"/>
+          </a:p>
+        </p:txBody>
+      </p:sp>
+      <p:sp>
+        <p:nvSpPr>
+          <p:cNvPr id="13" name="TextBox 12"/>
+          <p:cNvSpPr txBox="1"/>
+          <p:nvPr/>
+        </p:nvSpPr>
+        <p:spPr>
+          <a:xfrm>
+            <a:off x="8128000" y="10490200"/>
+            <a:ext cx="787588" cy="400110"/>
+          </a:xfrm>
+          <a:prstGeom prst="rect">
+            <a:avLst/>
+          </a:prstGeom>
+          <a:solidFill>
+            <a:schemeClr val="dk1">
+              <a:alpha val="50000"/>
+            </a:schemeClr>
+          </a:solidFill>
+          <a:ln>
+            <a:noFill/>
+          </a:ln>
+        </p:spPr>
+        <p:style>
+          <a:lnRef idx="0">
+            <a:scrgbClr r="0" g="0" b="0"/>
+          </a:lnRef>
+          <a:fillRef idx="0">
+            <a:scrgbClr r="0" g="0" b="0"/>
+          </a:fillRef>
+          <a:effectRef idx="0">
+            <a:scrgbClr r="0" g="0" b="0"/>
+          </a:effectRef>
+          <a:fontRef idx="minor">
+            <a:schemeClr val="lt1"/>
+          </a:fontRef>
+        </p:style>
+        <p:txBody>
+          <a:bodyPr wrap="none" rtlCol="0">
+            <a:spAutoFit/>
+          </a:bodyPr>
+          <a:lstStyle/>
+          <a:p>
+            <a:r>
+              <a:rPr lang="en-GB" sz="2000" b="1" dirty="0" smtClean="0"/>
+              <a:t>Brake</a:t>
+            </a:r>
+            <a:endParaRPr lang="en-GB" sz="2000" b="1" dirty="0"/>
+          </a:p>
+        </p:txBody>
+      </p:sp>
+      <p:sp>
+        <p:nvSpPr>
+          <p:cNvPr id="14" name="TextBox 13"/>
+          <p:cNvSpPr txBox="1"/>
+          <p:nvPr/>
+        </p:nvSpPr>
+        <p:spPr>
+          <a:xfrm>
+            <a:off x="9131300" y="10642600"/>
+            <a:ext cx="1098634" cy="400110"/>
+          </a:xfrm>
+          <a:prstGeom prst="rect">
+            <a:avLst/>
+          </a:prstGeom>
+          <a:solidFill>
+            <a:schemeClr val="dk1">
+              <a:alpha val="50000"/>
+            </a:schemeClr>
+          </a:solidFill>
+          <a:ln>
+            <a:noFill/>
+          </a:ln>
+        </p:spPr>
+        <p:style>
+          <a:lnRef idx="0">
+            <a:scrgbClr r="0" g="0" b="0"/>
+          </a:lnRef>
+          <a:fillRef idx="0">
+            <a:scrgbClr r="0" g="0" b="0"/>
+          </a:fillRef>
+          <a:effectRef idx="0">
+            <a:scrgbClr r="0" g="0" b="0"/>
+          </a:effectRef>
+          <a:fontRef idx="minor">
+            <a:schemeClr val="lt1"/>
+          </a:fontRef>
+        </p:style>
+        <p:txBody>
+          <a:bodyPr wrap="none" rtlCol="0">
+            <a:spAutoFit/>
+          </a:bodyPr>
+          <a:lstStyle/>
+          <a:p>
+            <a:r>
+              <a:rPr lang="en-GB" sz="2000" b="1" dirty="0" smtClean="0"/>
+              <a:t>Throttle </a:t>
+            </a:r>
+            <a:endParaRPr lang="en-GB" sz="2000" b="1" dirty="0"/>
+          </a:p>
+        </p:txBody>
+      </p:sp>
+    </p:spTree>
+    <p:extLst>
+      <p:ext uri="{BB962C8B-B14F-4D97-AF65-F5344CB8AC3E}">
+        <p14:creationId xmlns:p14="http://schemas.microsoft.com/office/powerpoint/2010/main" val="1830487976"/>
+      </p:ext>
+    </p:extLst>
+  </p:cSld>
+  <p:clrMapOvr>
+    <a:masterClrMapping/>
+  </p:clrMapOvr>
+</p:sld>
+</file>
+
 <file path=ppt/theme/theme1.xml><?xml version="1.0" encoding="utf-8"?>
 <a:theme xmlns:a="http://schemas.openxmlformats.org/drawingml/2006/main" name="Office Theme">
   <a:themeElements>

</xml_diff>